<commit_message>
winter camp 2024, final, hopefully
</commit_message>
<xml_diff>
--- a/ThreshFHE.pptx
+++ b/ThreshFHE.pptx
@@ -6,6 +6,9 @@
   </p:sldMasterIdLst>
   <p:sldIdLst>
     <p:sldId id="257" r:id="rId2"/>
+    <p:sldId id="258" r:id="rId3"/>
+    <p:sldId id="259" r:id="rId4"/>
+    <p:sldId id="260" r:id="rId5"/>
   </p:sldIdLst>
   <p:sldSz cx="12192000" cy="6858000"/>
   <p:notesSz cx="6858000" cy="9144000"/>
@@ -104,6 +107,11 @@
       </a:defRPr>
     </a:lvl9pPr>
   </p:defaultTextStyle>
+  <p:extLst>
+    <p:ext uri="{EFAFB233-063F-42B5-8137-9DF3F51BA10A}">
+      <p15:sldGuideLst xmlns:p15="http://schemas.microsoft.com/office/powerpoint/2012/main"/>
+    </p:ext>
+  </p:extLst>
 </p:presentation>
 </file>
 
@@ -254,7 +262,7 @@
           <a:p>
             <a:fld id="{26C3E251-9CF0-4576-BDF7-5ADB46520E34}" type="datetimeFigureOut">
               <a:rPr lang="ko-KR" altLang="en-US" smtClean="0"/>
-              <a:t>2024-01-03</a:t>
+              <a:t>2024-01-04</a:t>
             </a:fld>
             <a:endParaRPr lang="ko-KR" altLang="en-US"/>
           </a:p>
@@ -452,7 +460,7 @@
           <a:p>
             <a:fld id="{26C3E251-9CF0-4576-BDF7-5ADB46520E34}" type="datetimeFigureOut">
               <a:rPr lang="ko-KR" altLang="en-US" smtClean="0"/>
-              <a:t>2024-01-03</a:t>
+              <a:t>2024-01-04</a:t>
             </a:fld>
             <a:endParaRPr lang="ko-KR" altLang="en-US"/>
           </a:p>
@@ -660,7 +668,7 @@
           <a:p>
             <a:fld id="{26C3E251-9CF0-4576-BDF7-5ADB46520E34}" type="datetimeFigureOut">
               <a:rPr lang="ko-KR" altLang="en-US" smtClean="0"/>
-              <a:t>2024-01-03</a:t>
+              <a:t>2024-01-04</a:t>
             </a:fld>
             <a:endParaRPr lang="ko-KR" altLang="en-US"/>
           </a:p>
@@ -858,7 +866,7 @@
           <a:p>
             <a:fld id="{26C3E251-9CF0-4576-BDF7-5ADB46520E34}" type="datetimeFigureOut">
               <a:rPr lang="ko-KR" altLang="en-US" smtClean="0"/>
-              <a:t>2024-01-03</a:t>
+              <a:t>2024-01-04</a:t>
             </a:fld>
             <a:endParaRPr lang="ko-KR" altLang="en-US"/>
           </a:p>
@@ -1133,7 +1141,7 @@
           <a:p>
             <a:fld id="{26C3E251-9CF0-4576-BDF7-5ADB46520E34}" type="datetimeFigureOut">
               <a:rPr lang="ko-KR" altLang="en-US" smtClean="0"/>
-              <a:t>2024-01-03</a:t>
+              <a:t>2024-01-04</a:t>
             </a:fld>
             <a:endParaRPr lang="ko-KR" altLang="en-US"/>
           </a:p>
@@ -1398,7 +1406,7 @@
           <a:p>
             <a:fld id="{26C3E251-9CF0-4576-BDF7-5ADB46520E34}" type="datetimeFigureOut">
               <a:rPr lang="ko-KR" altLang="en-US" smtClean="0"/>
-              <a:t>2024-01-03</a:t>
+              <a:t>2024-01-04</a:t>
             </a:fld>
             <a:endParaRPr lang="ko-KR" altLang="en-US"/>
           </a:p>
@@ -1810,7 +1818,7 @@
           <a:p>
             <a:fld id="{26C3E251-9CF0-4576-BDF7-5ADB46520E34}" type="datetimeFigureOut">
               <a:rPr lang="ko-KR" altLang="en-US" smtClean="0"/>
-              <a:t>2024-01-03</a:t>
+              <a:t>2024-01-04</a:t>
             </a:fld>
             <a:endParaRPr lang="ko-KR" altLang="en-US"/>
           </a:p>
@@ -1951,7 +1959,7 @@
           <a:p>
             <a:fld id="{26C3E251-9CF0-4576-BDF7-5ADB46520E34}" type="datetimeFigureOut">
               <a:rPr lang="ko-KR" altLang="en-US" smtClean="0"/>
-              <a:t>2024-01-03</a:t>
+              <a:t>2024-01-04</a:t>
             </a:fld>
             <a:endParaRPr lang="ko-KR" altLang="en-US"/>
           </a:p>
@@ -2064,7 +2072,7 @@
           <a:p>
             <a:fld id="{26C3E251-9CF0-4576-BDF7-5ADB46520E34}" type="datetimeFigureOut">
               <a:rPr lang="ko-KR" altLang="en-US" smtClean="0"/>
-              <a:t>2024-01-03</a:t>
+              <a:t>2024-01-04</a:t>
             </a:fld>
             <a:endParaRPr lang="ko-KR" altLang="en-US"/>
           </a:p>
@@ -2375,7 +2383,7 @@
           <a:p>
             <a:fld id="{26C3E251-9CF0-4576-BDF7-5ADB46520E34}" type="datetimeFigureOut">
               <a:rPr lang="ko-KR" altLang="en-US" smtClean="0"/>
-              <a:t>2024-01-03</a:t>
+              <a:t>2024-01-04</a:t>
             </a:fld>
             <a:endParaRPr lang="ko-KR" altLang="en-US"/>
           </a:p>
@@ -2663,7 +2671,7 @@
           <a:p>
             <a:fld id="{26C3E251-9CF0-4576-BDF7-5ADB46520E34}" type="datetimeFigureOut">
               <a:rPr lang="ko-KR" altLang="en-US" smtClean="0"/>
-              <a:t>2024-01-03</a:t>
+              <a:t>2024-01-04</a:t>
             </a:fld>
             <a:endParaRPr lang="ko-KR" altLang="en-US"/>
           </a:p>
@@ -2904,7 +2912,7 @@
           <a:p>
             <a:fld id="{26C3E251-9CF0-4576-BDF7-5ADB46520E34}" type="datetimeFigureOut">
               <a:rPr lang="ko-KR" altLang="en-US" smtClean="0"/>
-              <a:t>2024-01-03</a:t>
+              <a:t>2024-01-04</a:t>
             </a:fld>
             <a:endParaRPr lang="ko-KR" altLang="en-US"/>
           </a:p>
@@ -3321,8 +3329,8 @@
           <a:chExt cx="0" cy="0"/>
         </a:xfrm>
       </p:grpSpPr>
-      <mc:AlternateContent xmlns:mc="http://schemas.openxmlformats.org/markup-compatibility/2006">
-        <mc:Choice xmlns:a14="http://schemas.microsoft.com/office/drawing/2010/main" Requires="a14">
+      <mc:AlternateContent xmlns:mc="http://schemas.openxmlformats.org/markup-compatibility/2006" xmlns:a14="http://schemas.microsoft.com/office/drawing/2010/main">
+        <mc:Choice Requires="a14">
           <p:sp>
             <p:nvSpPr>
               <p:cNvPr id="4" name="직사각형 3">
@@ -3410,7 +3418,7 @@
             </p:txBody>
           </p:sp>
         </mc:Choice>
-        <mc:Fallback>
+        <mc:Fallback xmlns="">
           <p:sp>
             <p:nvSpPr>
               <p:cNvPr id="4" name="직사각형 3">
@@ -3455,8 +3463,8 @@
           </p:sp>
         </mc:Fallback>
       </mc:AlternateContent>
-      <mc:AlternateContent xmlns:mc="http://schemas.openxmlformats.org/markup-compatibility/2006">
-        <mc:Choice xmlns:a14="http://schemas.microsoft.com/office/drawing/2010/main" Requires="a14">
+      <mc:AlternateContent xmlns:mc="http://schemas.openxmlformats.org/markup-compatibility/2006" xmlns:a14="http://schemas.microsoft.com/office/drawing/2010/main">
+        <mc:Choice Requires="a14">
           <p:sp>
             <p:nvSpPr>
               <p:cNvPr id="5" name="직사각형 4">
@@ -3544,7 +3552,7 @@
             </p:txBody>
           </p:sp>
         </mc:Choice>
-        <mc:Fallback>
+        <mc:Fallback xmlns="">
           <p:sp>
             <p:nvSpPr>
               <p:cNvPr id="5" name="직사각형 4">
@@ -3589,8 +3597,8 @@
           </p:sp>
         </mc:Fallback>
       </mc:AlternateContent>
-      <mc:AlternateContent xmlns:mc="http://schemas.openxmlformats.org/markup-compatibility/2006">
-        <mc:Choice xmlns:a14="http://schemas.microsoft.com/office/drawing/2010/main" Requires="a14">
+      <mc:AlternateContent xmlns:mc="http://schemas.openxmlformats.org/markup-compatibility/2006" xmlns:a14="http://schemas.microsoft.com/office/drawing/2010/main">
+        <mc:Choice Requires="a14">
           <p:sp>
             <p:nvSpPr>
               <p:cNvPr id="6" name="직사각형 5">
@@ -3678,7 +3686,7 @@
             </p:txBody>
           </p:sp>
         </mc:Choice>
-        <mc:Fallback>
+        <mc:Fallback xmlns="">
           <p:sp>
             <p:nvSpPr>
               <p:cNvPr id="6" name="직사각형 5">
@@ -3723,8 +3731,8 @@
           </p:sp>
         </mc:Fallback>
       </mc:AlternateContent>
-      <mc:AlternateContent xmlns:mc="http://schemas.openxmlformats.org/markup-compatibility/2006">
-        <mc:Choice xmlns:a14="http://schemas.microsoft.com/office/drawing/2010/main" Requires="a14">
+      <mc:AlternateContent xmlns:mc="http://schemas.openxmlformats.org/markup-compatibility/2006" xmlns:a14="http://schemas.microsoft.com/office/drawing/2010/main">
+        <mc:Choice Requires="a14">
           <p:sp>
             <p:nvSpPr>
               <p:cNvPr id="7" name="직사각형 6">
@@ -3812,7 +3820,7 @@
             </p:txBody>
           </p:sp>
         </mc:Choice>
-        <mc:Fallback>
+        <mc:Fallback xmlns="">
           <p:sp>
             <p:nvSpPr>
               <p:cNvPr id="7" name="직사각형 6">
@@ -3857,8 +3865,8 @@
           </p:sp>
         </mc:Fallback>
       </mc:AlternateContent>
-      <mc:AlternateContent xmlns:mc="http://schemas.openxmlformats.org/markup-compatibility/2006">
-        <mc:Choice xmlns:a14="http://schemas.microsoft.com/office/drawing/2010/main" Requires="a14">
+      <mc:AlternateContent xmlns:mc="http://schemas.openxmlformats.org/markup-compatibility/2006" xmlns:a14="http://schemas.microsoft.com/office/drawing/2010/main">
+        <mc:Choice Requires="a14">
           <p:sp>
             <p:nvSpPr>
               <p:cNvPr id="8" name="직사각형 7">
@@ -3946,7 +3954,7 @@
             </p:txBody>
           </p:sp>
         </mc:Choice>
-        <mc:Fallback>
+        <mc:Fallback xmlns="">
           <p:sp>
             <p:nvSpPr>
               <p:cNvPr id="8" name="직사각형 7">
@@ -3991,8 +3999,8 @@
           </p:sp>
         </mc:Fallback>
       </mc:AlternateContent>
-      <mc:AlternateContent xmlns:mc="http://schemas.openxmlformats.org/markup-compatibility/2006">
-        <mc:Choice xmlns:a14="http://schemas.microsoft.com/office/drawing/2010/main" Requires="a14">
+      <mc:AlternateContent xmlns:mc="http://schemas.openxmlformats.org/markup-compatibility/2006" xmlns:a14="http://schemas.microsoft.com/office/drawing/2010/main">
+        <mc:Choice Requires="a14">
           <p:sp>
             <p:nvSpPr>
               <p:cNvPr id="9" name="직사각형 8">
@@ -4080,7 +4088,7 @@
             </p:txBody>
           </p:sp>
         </mc:Choice>
-        <mc:Fallback>
+        <mc:Fallback xmlns="">
           <p:sp>
             <p:nvSpPr>
               <p:cNvPr id="9" name="직사각형 8">
@@ -4257,8 +4265,8 @@
           </a:p>
         </p:txBody>
       </p:sp>
-      <mc:AlternateContent xmlns:mc="http://schemas.openxmlformats.org/markup-compatibility/2006">
-        <mc:Choice xmlns:a14="http://schemas.microsoft.com/office/drawing/2010/main" Requires="a14">
+      <mc:AlternateContent xmlns:mc="http://schemas.openxmlformats.org/markup-compatibility/2006" xmlns:a14="http://schemas.microsoft.com/office/drawing/2010/main">
+        <mc:Choice Requires="a14">
           <p:sp>
             <p:nvSpPr>
               <p:cNvPr id="29" name="TextBox 28">
@@ -4287,6 +4295,7 @@
               </a:bodyPr>
               <a:lstStyle/>
               <a:p>
+                <a:pPr/>
                 <a14:m>
                   <m:oMathPara xmlns:m="http://schemas.openxmlformats.org/officeDocument/2006/math">
                     <m:oMathParaPr>
@@ -4463,7 +4472,7 @@
             </p:txBody>
           </p:sp>
         </mc:Choice>
-        <mc:Fallback>
+        <mc:Fallback xmlns="">
           <p:sp>
             <p:nvSpPr>
               <p:cNvPr id="29" name="TextBox 28">
@@ -4548,8 +4557,8 @@
           </a:p>
         </p:txBody>
       </p:sp>
-      <mc:AlternateContent xmlns:mc="http://schemas.openxmlformats.org/markup-compatibility/2006">
-        <mc:Choice xmlns:a14="http://schemas.microsoft.com/office/drawing/2010/main" Requires="a14">
+      <mc:AlternateContent xmlns:mc="http://schemas.openxmlformats.org/markup-compatibility/2006" xmlns:a14="http://schemas.microsoft.com/office/drawing/2010/main">
+        <mc:Choice Requires="a14">
           <p:sp>
             <p:nvSpPr>
               <p:cNvPr id="31" name="TextBox 30">
@@ -4830,7 +4839,7 @@
                     <m:d>
                       <m:dPr>
                         <m:ctrlPr>
-                          <a:rPr lang="en-US" altLang="ko-KR" sz="1200" b="0" i="0" smtClean="0">
+                          <a:rPr lang="en-US" altLang="ko-KR" sz="1200" b="0" i="1" smtClean="0">
                             <a:latin typeface="Cambria Math" panose="02040503050406030204" pitchFamily="18" charset="0"/>
                           </a:rPr>
                         </m:ctrlPr>
@@ -5012,7 +5021,7 @@
             </p:txBody>
           </p:sp>
         </mc:Choice>
-        <mc:Fallback>
+        <mc:Fallback xmlns="">
           <p:sp>
             <p:nvSpPr>
               <p:cNvPr id="31" name="TextBox 30">
@@ -5061,6 +5070,2357 @@
     <p:extLst>
       <p:ext uri="{BB962C8B-B14F-4D97-AF65-F5344CB8AC3E}">
         <p14:creationId xmlns:p14="http://schemas.microsoft.com/office/powerpoint/2010/main" val="1619965233"/>
+      </p:ext>
+    </p:extLst>
+  </p:cSld>
+  <p:clrMapOvr>
+    <a:masterClrMapping/>
+  </p:clrMapOvr>
+</p:sld>
+</file>
+
+<file path=ppt/slides/slide2.xml><?xml version="1.0" encoding="utf-8"?>
+<p:sld xmlns:a="http://schemas.openxmlformats.org/drawingml/2006/main" xmlns:r="http://schemas.openxmlformats.org/officeDocument/2006/relationships" xmlns:p="http://schemas.openxmlformats.org/presentationml/2006/main">
+  <p:cSld>
+    <p:spTree>
+      <p:nvGrpSpPr>
+        <p:cNvPr id="1" name=""/>
+        <p:cNvGrpSpPr/>
+        <p:nvPr/>
+      </p:nvGrpSpPr>
+      <p:grpSpPr>
+        <a:xfrm>
+          <a:off x="0" y="0"/>
+          <a:ext cx="0" cy="0"/>
+          <a:chOff x="0" y="0"/>
+          <a:chExt cx="0" cy="0"/>
+        </a:xfrm>
+      </p:grpSpPr>
+      <p:sp>
+        <p:nvSpPr>
+          <p:cNvPr id="25" name="사각형: 둥근 모서리 24">
+            <a:extLst>
+              <a:ext uri="{FF2B5EF4-FFF2-40B4-BE49-F238E27FC236}">
+                <a16:creationId xmlns:a16="http://schemas.microsoft.com/office/drawing/2014/main" id="{E12134C7-E68B-9994-DDC6-FF330DF01A6B}"/>
+              </a:ext>
+            </a:extLst>
+          </p:cNvPr>
+          <p:cNvSpPr/>
+          <p:nvPr/>
+        </p:nvSpPr>
+        <p:spPr>
+          <a:xfrm>
+            <a:off x="3062796" y="1793289"/>
+            <a:ext cx="6409678" cy="3222594"/>
+          </a:xfrm>
+          <a:prstGeom prst="roundRect">
+            <a:avLst/>
+          </a:prstGeom>
+        </p:spPr>
+        <p:style>
+          <a:lnRef idx="2">
+            <a:schemeClr val="dk1"/>
+          </a:lnRef>
+          <a:fillRef idx="1">
+            <a:schemeClr val="lt1"/>
+          </a:fillRef>
+          <a:effectRef idx="0">
+            <a:schemeClr val="dk1"/>
+          </a:effectRef>
+          <a:fontRef idx="minor">
+            <a:schemeClr val="dk1"/>
+          </a:fontRef>
+        </p:style>
+        <p:txBody>
+          <a:bodyPr rtlCol="0" anchor="ctr"/>
+          <a:lstStyle/>
+          <a:p>
+            <a:pPr algn="ctr"/>
+            <a:endParaRPr lang="ko-KR" altLang="en-US"/>
+          </a:p>
+        </p:txBody>
+      </p:sp>
+      <p:sp>
+        <p:nvSpPr>
+          <p:cNvPr id="26" name="사각형: 둥근 모서리 25">
+            <a:extLst>
+              <a:ext uri="{FF2B5EF4-FFF2-40B4-BE49-F238E27FC236}">
+                <a16:creationId xmlns:a16="http://schemas.microsoft.com/office/drawing/2014/main" id="{A4D1272A-11FA-6ECE-C801-961A07661D2A}"/>
+              </a:ext>
+            </a:extLst>
+          </p:cNvPr>
+          <p:cNvSpPr/>
+          <p:nvPr/>
+        </p:nvSpPr>
+        <p:spPr>
+          <a:xfrm>
+            <a:off x="3684233" y="2396971"/>
+            <a:ext cx="4128117" cy="2121763"/>
+          </a:xfrm>
+          <a:prstGeom prst="roundRect">
+            <a:avLst/>
+          </a:prstGeom>
+        </p:spPr>
+        <p:style>
+          <a:lnRef idx="2">
+            <a:schemeClr val="dk1"/>
+          </a:lnRef>
+          <a:fillRef idx="1">
+            <a:schemeClr val="lt1"/>
+          </a:fillRef>
+          <a:effectRef idx="0">
+            <a:schemeClr val="dk1"/>
+          </a:effectRef>
+          <a:fontRef idx="minor">
+            <a:schemeClr val="dk1"/>
+          </a:fontRef>
+        </p:style>
+        <p:txBody>
+          <a:bodyPr rtlCol="0" anchor="ctr"/>
+          <a:lstStyle/>
+          <a:p>
+            <a:pPr algn="ctr"/>
+            <a:endParaRPr lang="ko-KR" altLang="en-US" dirty="0"/>
+          </a:p>
+        </p:txBody>
+      </p:sp>
+      <p:sp>
+        <p:nvSpPr>
+          <p:cNvPr id="27" name="TextBox 26">
+            <a:extLst>
+              <a:ext uri="{FF2B5EF4-FFF2-40B4-BE49-F238E27FC236}">
+                <a16:creationId xmlns:a16="http://schemas.microsoft.com/office/drawing/2014/main" id="{D4018468-B789-D55E-DC50-29112FB7B099}"/>
+              </a:ext>
+            </a:extLst>
+          </p:cNvPr>
+          <p:cNvSpPr txBox="1"/>
+          <p:nvPr/>
+        </p:nvSpPr>
+        <p:spPr>
+          <a:xfrm>
+            <a:off x="8300449" y="2212305"/>
+            <a:ext cx="728084" cy="369332"/>
+          </a:xfrm>
+          <a:prstGeom prst="rect">
+            <a:avLst/>
+          </a:prstGeom>
+          <a:noFill/>
+        </p:spPr>
+        <p:txBody>
+          <a:bodyPr wrap="none" rtlCol="0">
+            <a:spAutoFit/>
+          </a:bodyPr>
+          <a:lstStyle/>
+          <a:p>
+            <a:r>
+              <a:rPr lang="en-US" altLang="ko-KR" dirty="0"/>
+              <a:t>CKKS</a:t>
+            </a:r>
+            <a:endParaRPr lang="ko-KR" altLang="en-US" dirty="0"/>
+          </a:p>
+        </p:txBody>
+      </p:sp>
+      <p:sp>
+        <p:nvSpPr>
+          <p:cNvPr id="28" name="TextBox 27">
+            <a:extLst>
+              <a:ext uri="{FF2B5EF4-FFF2-40B4-BE49-F238E27FC236}">
+                <a16:creationId xmlns:a16="http://schemas.microsoft.com/office/drawing/2014/main" id="{7A1E58D4-49C1-B83F-DD68-018483FDD103}"/>
+              </a:ext>
+            </a:extLst>
+          </p:cNvPr>
+          <p:cNvSpPr txBox="1"/>
+          <p:nvPr/>
+        </p:nvSpPr>
+        <p:spPr>
+          <a:xfrm>
+            <a:off x="5567796" y="1531358"/>
+            <a:ext cx="1399679" cy="461665"/>
+          </a:xfrm>
+          <a:prstGeom prst="rect">
+            <a:avLst/>
+          </a:prstGeom>
+          <a:solidFill>
+            <a:schemeClr val="bg1"/>
+          </a:solidFill>
+        </p:spPr>
+        <p:txBody>
+          <a:bodyPr wrap="none" rtlCol="0">
+            <a:spAutoFit/>
+          </a:bodyPr>
+          <a:lstStyle/>
+          <a:p>
+            <a:r>
+              <a:rPr lang="en-US" altLang="ko-KR" sz="2400" dirty="0"/>
+              <a:t>IND-CPA</a:t>
+            </a:r>
+            <a:endParaRPr lang="ko-KR" altLang="en-US" sz="2400" dirty="0"/>
+          </a:p>
+        </p:txBody>
+      </p:sp>
+      <p:sp>
+        <p:nvSpPr>
+          <p:cNvPr id="29" name="TextBox 28">
+            <a:extLst>
+              <a:ext uri="{FF2B5EF4-FFF2-40B4-BE49-F238E27FC236}">
+                <a16:creationId xmlns:a16="http://schemas.microsoft.com/office/drawing/2014/main" id="{32591C6D-6C17-7F18-EF45-4ACF3308BFFC}"/>
+              </a:ext>
+            </a:extLst>
+          </p:cNvPr>
+          <p:cNvSpPr txBox="1"/>
+          <p:nvPr/>
+        </p:nvSpPr>
+        <p:spPr>
+          <a:xfrm>
+            <a:off x="5438948" y="3001489"/>
+            <a:ext cx="580608" cy="369332"/>
+          </a:xfrm>
+          <a:prstGeom prst="rect">
+            <a:avLst/>
+          </a:prstGeom>
+          <a:noFill/>
+        </p:spPr>
+        <p:txBody>
+          <a:bodyPr wrap="none" rtlCol="0">
+            <a:spAutoFit/>
+          </a:bodyPr>
+          <a:lstStyle/>
+          <a:p>
+            <a:r>
+              <a:rPr lang="en-US" altLang="ko-KR" dirty="0"/>
+              <a:t>BFV</a:t>
+            </a:r>
+            <a:endParaRPr lang="ko-KR" altLang="en-US" dirty="0"/>
+          </a:p>
+        </p:txBody>
+      </p:sp>
+      <p:sp>
+        <p:nvSpPr>
+          <p:cNvPr id="30" name="TextBox 29">
+            <a:extLst>
+              <a:ext uri="{FF2B5EF4-FFF2-40B4-BE49-F238E27FC236}">
+                <a16:creationId xmlns:a16="http://schemas.microsoft.com/office/drawing/2014/main" id="{D25929A7-BA34-CCBC-1195-3B984C92458D}"/>
+              </a:ext>
+            </a:extLst>
+          </p:cNvPr>
+          <p:cNvSpPr txBox="1"/>
+          <p:nvPr/>
+        </p:nvSpPr>
+        <p:spPr>
+          <a:xfrm>
+            <a:off x="4245999" y="3255518"/>
+            <a:ext cx="561372" cy="369332"/>
+          </a:xfrm>
+          <a:prstGeom prst="rect">
+            <a:avLst/>
+          </a:prstGeom>
+          <a:noFill/>
+        </p:spPr>
+        <p:txBody>
+          <a:bodyPr wrap="none" rtlCol="0">
+            <a:spAutoFit/>
+          </a:bodyPr>
+          <a:lstStyle/>
+          <a:p>
+            <a:r>
+              <a:rPr lang="en-US" altLang="ko-KR" dirty="0"/>
+              <a:t>DM</a:t>
+            </a:r>
+            <a:endParaRPr lang="ko-KR" altLang="en-US" dirty="0"/>
+          </a:p>
+        </p:txBody>
+      </p:sp>
+      <p:sp>
+        <p:nvSpPr>
+          <p:cNvPr id="31" name="TextBox 30">
+            <a:extLst>
+              <a:ext uri="{FF2B5EF4-FFF2-40B4-BE49-F238E27FC236}">
+                <a16:creationId xmlns:a16="http://schemas.microsoft.com/office/drawing/2014/main" id="{7A2A30D1-BD07-832C-F1EC-6453329482B6}"/>
+              </a:ext>
+            </a:extLst>
+          </p:cNvPr>
+          <p:cNvSpPr txBox="1"/>
+          <p:nvPr/>
+        </p:nvSpPr>
+        <p:spPr>
+          <a:xfrm>
+            <a:off x="5121783" y="3789837"/>
+            <a:ext cx="710194" cy="369332"/>
+          </a:xfrm>
+          <a:prstGeom prst="rect">
+            <a:avLst/>
+          </a:prstGeom>
+          <a:noFill/>
+        </p:spPr>
+        <p:txBody>
+          <a:bodyPr wrap="none" rtlCol="0">
+            <a:spAutoFit/>
+          </a:bodyPr>
+          <a:lstStyle/>
+          <a:p>
+            <a:r>
+              <a:rPr lang="en-US" altLang="ko-KR" dirty="0"/>
+              <a:t>CGGI</a:t>
+            </a:r>
+            <a:endParaRPr lang="ko-KR" altLang="en-US" dirty="0"/>
+          </a:p>
+        </p:txBody>
+      </p:sp>
+      <p:sp>
+        <p:nvSpPr>
+          <p:cNvPr id="32" name="TextBox 31">
+            <a:extLst>
+              <a:ext uri="{FF2B5EF4-FFF2-40B4-BE49-F238E27FC236}">
+                <a16:creationId xmlns:a16="http://schemas.microsoft.com/office/drawing/2014/main" id="{5F257072-42BA-FF6D-F71D-CE7047C311CD}"/>
+              </a:ext>
+            </a:extLst>
+          </p:cNvPr>
+          <p:cNvSpPr txBox="1"/>
+          <p:nvPr/>
+        </p:nvSpPr>
+        <p:spPr>
+          <a:xfrm>
+            <a:off x="6467495" y="3589252"/>
+            <a:ext cx="623825" cy="369332"/>
+          </a:xfrm>
+          <a:prstGeom prst="rect">
+            <a:avLst/>
+          </a:prstGeom>
+          <a:noFill/>
+        </p:spPr>
+        <p:txBody>
+          <a:bodyPr wrap="none" rtlCol="0">
+            <a:spAutoFit/>
+          </a:bodyPr>
+          <a:lstStyle/>
+          <a:p>
+            <a:r>
+              <a:rPr lang="en-US" altLang="ko-KR" dirty="0"/>
+              <a:t>BGV</a:t>
+            </a:r>
+            <a:endParaRPr lang="ko-KR" altLang="en-US" dirty="0"/>
+          </a:p>
+        </p:txBody>
+      </p:sp>
+      <mc:AlternateContent xmlns:mc="http://schemas.openxmlformats.org/markup-compatibility/2006" xmlns:a14="http://schemas.microsoft.com/office/drawing/2010/main">
+        <mc:Choice Requires="a14">
+          <p:sp>
+            <p:nvSpPr>
+              <p:cNvPr id="33" name="TextBox 32">
+                <a:extLst>
+                  <a:ext uri="{FF2B5EF4-FFF2-40B4-BE49-F238E27FC236}">
+                    <a16:creationId xmlns:a16="http://schemas.microsoft.com/office/drawing/2014/main" id="{D19B02BB-C134-21CA-34F9-375D34D99CE5}"/>
+                  </a:ext>
+                </a:extLst>
+              </p:cNvPr>
+              <p:cNvSpPr txBox="1"/>
+              <p:nvPr/>
+            </p:nvSpPr>
+            <p:spPr>
+              <a:xfrm>
+                <a:off x="4768728" y="2096872"/>
+                <a:ext cx="1959126" cy="539700"/>
+              </a:xfrm>
+              <a:prstGeom prst="rect">
+                <a:avLst/>
+              </a:prstGeom>
+              <a:solidFill>
+                <a:schemeClr val="bg1"/>
+              </a:solidFill>
+            </p:spPr>
+            <p:txBody>
+              <a:bodyPr wrap="none" rtlCol="0">
+                <a:spAutoFit/>
+              </a:bodyPr>
+              <a:lstStyle/>
+              <a:p>
+                <a:pPr/>
+                <a14:m>
+                  <m:oMathPara xmlns:m="http://schemas.openxmlformats.org/officeDocument/2006/math">
+                    <m:oMathParaPr>
+                      <m:jc m:val="centerGroup"/>
+                    </m:oMathParaPr>
+                    <m:oMath xmlns:m="http://schemas.openxmlformats.org/officeDocument/2006/math">
+                      <m:sSup>
+                        <m:sSupPr>
+                          <m:ctrlPr>
+                            <a:rPr lang="en-US" altLang="ko-KR" sz="2400" b="0" i="1" smtClean="0">
+                              <a:latin typeface="Cambria Math" panose="02040503050406030204" pitchFamily="18" charset="0"/>
+                            </a:rPr>
+                          </m:ctrlPr>
+                        </m:sSupPr>
+                        <m:e>
+                          <m:r>
+                            <m:rPr>
+                              <m:nor/>
+                            </m:rPr>
+                            <a:rPr lang="en-US" altLang="ko-KR" sz="2400" dirty="0"/>
+                            <m:t>IND</m:t>
+                          </m:r>
+                          <m:r>
+                            <m:rPr>
+                              <m:nor/>
+                            </m:rPr>
+                            <a:rPr lang="en-US" altLang="ko-KR" sz="2400" dirty="0"/>
+                            <m:t>−</m:t>
+                          </m:r>
+                          <m:r>
+                            <m:rPr>
+                              <m:nor/>
+                            </m:rPr>
+                            <a:rPr lang="en-US" altLang="ko-KR" sz="2400" dirty="0"/>
+                            <m:t>CPA</m:t>
+                          </m:r>
+                          <m:r>
+                            <m:rPr>
+                              <m:nor/>
+                            </m:rPr>
+                            <a:rPr lang="ko-KR" altLang="en-US" sz="2400" dirty="0"/>
+                            <m:t> </m:t>
+                          </m:r>
+                        </m:e>
+                        <m:sup>
+                          <m:r>
+                            <m:rPr>
+                              <m:nor/>
+                            </m:rPr>
+                            <a:rPr lang="en-US" altLang="ko-KR" sz="2400" dirty="0"/>
+                            <m:t>D</m:t>
+                          </m:r>
+                        </m:sup>
+                      </m:sSup>
+                      <m:r>
+                        <a:rPr lang="en-US" altLang="ko-KR" sz="2400" b="0" i="1" smtClean="0">
+                          <a:latin typeface="Cambria Math" panose="02040503050406030204" pitchFamily="18" charset="0"/>
+                        </a:rPr>
+                        <m:t> </m:t>
+                      </m:r>
+                    </m:oMath>
+                  </m:oMathPara>
+                </a14:m>
+                <a:endParaRPr lang="ko-KR" altLang="en-US" sz="2400" dirty="0"/>
+              </a:p>
+            </p:txBody>
+          </p:sp>
+        </mc:Choice>
+        <mc:Fallback xmlns="">
+          <p:sp>
+            <p:nvSpPr>
+              <p:cNvPr id="33" name="TextBox 32">
+                <a:extLst>
+                  <a:ext uri="{FF2B5EF4-FFF2-40B4-BE49-F238E27FC236}">
+                    <a16:creationId xmlns:a16="http://schemas.microsoft.com/office/drawing/2014/main" id="{D19B02BB-C134-21CA-34F9-375D34D99CE5}"/>
+                  </a:ext>
+                </a:extLst>
+              </p:cNvPr>
+              <p:cNvSpPr txBox="1">
+                <a:spLocks noRot="1" noChangeAspect="1" noMove="1" noResize="1" noEditPoints="1" noAdjustHandles="1" noChangeArrowheads="1" noChangeShapeType="1" noTextEdit="1"/>
+              </p:cNvSpPr>
+              <p:nvPr/>
+            </p:nvSpPr>
+            <p:spPr>
+              <a:xfrm>
+                <a:off x="4768728" y="2096872"/>
+                <a:ext cx="1959126" cy="539700"/>
+              </a:xfrm>
+              <a:prstGeom prst="rect">
+                <a:avLst/>
+              </a:prstGeom>
+              <a:blipFill>
+                <a:blip r:embed="rId2"/>
+                <a:stretch>
+                  <a:fillRect/>
+                </a:stretch>
+              </a:blipFill>
+            </p:spPr>
+            <p:txBody>
+              <a:bodyPr/>
+              <a:lstStyle/>
+              <a:p>
+                <a:r>
+                  <a:rPr lang="ko-KR" altLang="en-US">
+                    <a:noFill/>
+                  </a:rPr>
+                  <a:t> </a:t>
+                </a:r>
+              </a:p>
+            </p:txBody>
+          </p:sp>
+        </mc:Fallback>
+      </mc:AlternateContent>
+      <mc:AlternateContent xmlns:mc="http://schemas.openxmlformats.org/markup-compatibility/2006" xmlns:a14="http://schemas.microsoft.com/office/drawing/2010/main">
+        <mc:Choice Requires="a14">
+          <p:sp>
+            <p:nvSpPr>
+              <p:cNvPr id="34" name="TextBox 33">
+                <a:extLst>
+                  <a:ext uri="{FF2B5EF4-FFF2-40B4-BE49-F238E27FC236}">
+                    <a16:creationId xmlns:a16="http://schemas.microsoft.com/office/drawing/2014/main" id="{37FD5F54-9F0E-52ED-74A8-6FB3B0BA629D}"/>
+                  </a:ext>
+                </a:extLst>
+              </p:cNvPr>
+              <p:cNvSpPr txBox="1"/>
+              <p:nvPr/>
+            </p:nvSpPr>
+            <p:spPr>
+              <a:xfrm>
+                <a:off x="6469226" y="2640675"/>
+                <a:ext cx="1244187" cy="704873"/>
+              </a:xfrm>
+              <a:prstGeom prst="rect">
+                <a:avLst/>
+              </a:prstGeom>
+              <a:noFill/>
+            </p:spPr>
+            <p:txBody>
+              <a:bodyPr wrap="none" rtlCol="0">
+                <a:spAutoFit/>
+              </a:bodyPr>
+              <a:lstStyle/>
+              <a:p>
+                <a:pPr/>
+                <a14:m>
+                  <m:oMathPara xmlns:m="http://schemas.openxmlformats.org/officeDocument/2006/math">
+                    <m:oMathParaPr>
+                      <m:jc m:val="centerGroup"/>
+                    </m:oMathParaPr>
+                    <m:oMath xmlns:m="http://schemas.openxmlformats.org/officeDocument/2006/math">
+                      <m:sSup>
+                        <m:sSupPr>
+                          <m:ctrlPr>
+                            <a:rPr lang="en-US" altLang="ko-KR" b="0" i="1" smtClean="0">
+                              <a:latin typeface="Cambria Math" panose="02040503050406030204" pitchFamily="18" charset="0"/>
+                            </a:rPr>
+                          </m:ctrlPr>
+                        </m:sSupPr>
+                        <m:e>
+                          <m:r>
+                            <m:rPr>
+                              <m:nor/>
+                            </m:rPr>
+                            <a:rPr lang="en-US" altLang="ko-KR" dirty="0"/>
+                            <m:t>CKKS</m:t>
+                          </m:r>
+                        </m:e>
+                        <m:sup>
+                          <m:r>
+                            <m:rPr>
+                              <m:nor/>
+                            </m:rPr>
+                            <a:rPr lang="en-US" altLang="ko-KR" dirty="0"/>
+                            <m:t>D</m:t>
+                          </m:r>
+                          <m:r>
+                            <m:rPr>
+                              <m:nor/>
+                            </m:rPr>
+                            <a:rPr lang="en-US" altLang="ko-KR" b="0" i="0" dirty="0" smtClean="0"/>
+                            <m:t>P</m:t>
+                          </m:r>
+                        </m:sup>
+                      </m:sSup>
+                      <m:r>
+                        <a:rPr lang="en-US" altLang="ko-KR" b="0" i="1" smtClean="0">
+                          <a:latin typeface="Cambria Math" panose="02040503050406030204" pitchFamily="18" charset="0"/>
+                        </a:rPr>
+                        <m:t> </m:t>
+                      </m:r>
+                    </m:oMath>
+                  </m:oMathPara>
+                </a14:m>
+                <a:endParaRPr lang="ko-KR" altLang="en-US" dirty="0"/>
+              </a:p>
+              <a:p>
+                <a:endParaRPr lang="ko-KR" altLang="en-US" dirty="0"/>
+              </a:p>
+            </p:txBody>
+          </p:sp>
+        </mc:Choice>
+        <mc:Fallback xmlns="">
+          <p:sp>
+            <p:nvSpPr>
+              <p:cNvPr id="34" name="TextBox 33">
+                <a:extLst>
+                  <a:ext uri="{FF2B5EF4-FFF2-40B4-BE49-F238E27FC236}">
+                    <a16:creationId xmlns:a16="http://schemas.microsoft.com/office/drawing/2014/main" id="{37FD5F54-9F0E-52ED-74A8-6FB3B0BA629D}"/>
+                  </a:ext>
+                </a:extLst>
+              </p:cNvPr>
+              <p:cNvSpPr txBox="1">
+                <a:spLocks noRot="1" noChangeAspect="1" noMove="1" noResize="1" noEditPoints="1" noAdjustHandles="1" noChangeArrowheads="1" noChangeShapeType="1" noTextEdit="1"/>
+              </p:cNvSpPr>
+              <p:nvPr/>
+            </p:nvSpPr>
+            <p:spPr>
+              <a:xfrm>
+                <a:off x="6469226" y="2640675"/>
+                <a:ext cx="1244187" cy="704873"/>
+              </a:xfrm>
+              <a:prstGeom prst="rect">
+                <a:avLst/>
+              </a:prstGeom>
+              <a:blipFill>
+                <a:blip r:embed="rId3"/>
+                <a:stretch>
+                  <a:fillRect/>
+                </a:stretch>
+              </a:blipFill>
+            </p:spPr>
+            <p:txBody>
+              <a:bodyPr/>
+              <a:lstStyle/>
+              <a:p>
+                <a:r>
+                  <a:rPr lang="ko-KR" altLang="en-US">
+                    <a:noFill/>
+                  </a:rPr>
+                  <a:t> </a:t>
+                </a:r>
+              </a:p>
+            </p:txBody>
+          </p:sp>
+        </mc:Fallback>
+      </mc:AlternateContent>
+    </p:spTree>
+    <p:extLst>
+      <p:ext uri="{BB962C8B-B14F-4D97-AF65-F5344CB8AC3E}">
+        <p14:creationId xmlns:p14="http://schemas.microsoft.com/office/powerpoint/2010/main" val="2436198593"/>
+      </p:ext>
+    </p:extLst>
+  </p:cSld>
+  <p:clrMapOvr>
+    <a:masterClrMapping/>
+  </p:clrMapOvr>
+</p:sld>
+</file>
+
+<file path=ppt/slides/slide3.xml><?xml version="1.0" encoding="utf-8"?>
+<p:sld xmlns:a="http://schemas.openxmlformats.org/drawingml/2006/main" xmlns:r="http://schemas.openxmlformats.org/officeDocument/2006/relationships" xmlns:p="http://schemas.openxmlformats.org/presentationml/2006/main">
+  <p:cSld>
+    <p:spTree>
+      <p:nvGrpSpPr>
+        <p:cNvPr id="1" name=""/>
+        <p:cNvGrpSpPr/>
+        <p:nvPr/>
+      </p:nvGrpSpPr>
+      <p:grpSpPr>
+        <a:xfrm>
+          <a:off x="0" y="0"/>
+          <a:ext cx="0" cy="0"/>
+          <a:chOff x="0" y="0"/>
+          <a:chExt cx="0" cy="0"/>
+        </a:xfrm>
+      </p:grpSpPr>
+      <p:sp>
+        <p:nvSpPr>
+          <p:cNvPr id="2" name="사각형: 둥근 모서리 1">
+            <a:extLst>
+              <a:ext uri="{FF2B5EF4-FFF2-40B4-BE49-F238E27FC236}">
+                <a16:creationId xmlns:a16="http://schemas.microsoft.com/office/drawing/2014/main" id="{A39E7710-6120-179B-96ED-7F9567BAC403}"/>
+              </a:ext>
+            </a:extLst>
+          </p:cNvPr>
+          <p:cNvSpPr/>
+          <p:nvPr/>
+        </p:nvSpPr>
+        <p:spPr>
+          <a:xfrm>
+            <a:off x="3062796" y="1793289"/>
+            <a:ext cx="6409678" cy="3222594"/>
+          </a:xfrm>
+          <a:prstGeom prst="roundRect">
+            <a:avLst/>
+          </a:prstGeom>
+        </p:spPr>
+        <p:style>
+          <a:lnRef idx="2">
+            <a:schemeClr val="dk1"/>
+          </a:lnRef>
+          <a:fillRef idx="1">
+            <a:schemeClr val="lt1"/>
+          </a:fillRef>
+          <a:effectRef idx="0">
+            <a:schemeClr val="dk1"/>
+          </a:effectRef>
+          <a:fontRef idx="minor">
+            <a:schemeClr val="dk1"/>
+          </a:fontRef>
+        </p:style>
+        <p:txBody>
+          <a:bodyPr rtlCol="0" anchor="ctr"/>
+          <a:lstStyle/>
+          <a:p>
+            <a:pPr algn="ctr"/>
+            <a:endParaRPr lang="ko-KR" altLang="en-US"/>
+          </a:p>
+        </p:txBody>
+      </p:sp>
+      <p:sp>
+        <p:nvSpPr>
+          <p:cNvPr id="3" name="사각형: 둥근 모서리 2">
+            <a:extLst>
+              <a:ext uri="{FF2B5EF4-FFF2-40B4-BE49-F238E27FC236}">
+                <a16:creationId xmlns:a16="http://schemas.microsoft.com/office/drawing/2014/main" id="{BBD0439B-3FCA-74A6-321E-3309EF828BFE}"/>
+              </a:ext>
+            </a:extLst>
+          </p:cNvPr>
+          <p:cNvSpPr/>
+          <p:nvPr/>
+        </p:nvSpPr>
+        <p:spPr>
+          <a:xfrm>
+            <a:off x="3684233" y="2396971"/>
+            <a:ext cx="4128117" cy="2121763"/>
+          </a:xfrm>
+          <a:prstGeom prst="roundRect">
+            <a:avLst/>
+          </a:prstGeom>
+        </p:spPr>
+        <p:style>
+          <a:lnRef idx="2">
+            <a:schemeClr val="dk1"/>
+          </a:lnRef>
+          <a:fillRef idx="1">
+            <a:schemeClr val="lt1"/>
+          </a:fillRef>
+          <a:effectRef idx="0">
+            <a:schemeClr val="dk1"/>
+          </a:effectRef>
+          <a:fontRef idx="minor">
+            <a:schemeClr val="dk1"/>
+          </a:fontRef>
+        </p:style>
+        <p:txBody>
+          <a:bodyPr rtlCol="0" anchor="ctr"/>
+          <a:lstStyle/>
+          <a:p>
+            <a:pPr algn="ctr"/>
+            <a:endParaRPr lang="ko-KR" altLang="en-US" dirty="0"/>
+          </a:p>
+        </p:txBody>
+      </p:sp>
+      <p:sp>
+        <p:nvSpPr>
+          <p:cNvPr id="4" name="TextBox 3">
+            <a:extLst>
+              <a:ext uri="{FF2B5EF4-FFF2-40B4-BE49-F238E27FC236}">
+                <a16:creationId xmlns:a16="http://schemas.microsoft.com/office/drawing/2014/main" id="{F579A72D-7DEB-C015-A8DF-BCE5AB65AF06}"/>
+              </a:ext>
+            </a:extLst>
+          </p:cNvPr>
+          <p:cNvSpPr txBox="1"/>
+          <p:nvPr/>
+        </p:nvSpPr>
+        <p:spPr>
+          <a:xfrm>
+            <a:off x="8300449" y="2212305"/>
+            <a:ext cx="728084" cy="369332"/>
+          </a:xfrm>
+          <a:prstGeom prst="rect">
+            <a:avLst/>
+          </a:prstGeom>
+          <a:noFill/>
+        </p:spPr>
+        <p:txBody>
+          <a:bodyPr wrap="none" rtlCol="0">
+            <a:spAutoFit/>
+          </a:bodyPr>
+          <a:lstStyle/>
+          <a:p>
+            <a:r>
+              <a:rPr lang="en-US" altLang="ko-KR" dirty="0"/>
+              <a:t>CKKS</a:t>
+            </a:r>
+            <a:endParaRPr lang="ko-KR" altLang="en-US" dirty="0"/>
+          </a:p>
+        </p:txBody>
+      </p:sp>
+      <p:sp>
+        <p:nvSpPr>
+          <p:cNvPr id="6" name="TextBox 5">
+            <a:extLst>
+              <a:ext uri="{FF2B5EF4-FFF2-40B4-BE49-F238E27FC236}">
+                <a16:creationId xmlns:a16="http://schemas.microsoft.com/office/drawing/2014/main" id="{17FF1272-F4AE-AE7D-A957-3BF3AABF0F0A}"/>
+              </a:ext>
+            </a:extLst>
+          </p:cNvPr>
+          <p:cNvSpPr txBox="1"/>
+          <p:nvPr/>
+        </p:nvSpPr>
+        <p:spPr>
+          <a:xfrm>
+            <a:off x="5567796" y="1531358"/>
+            <a:ext cx="1399679" cy="461665"/>
+          </a:xfrm>
+          <a:prstGeom prst="rect">
+            <a:avLst/>
+          </a:prstGeom>
+          <a:solidFill>
+            <a:schemeClr val="bg1"/>
+          </a:solidFill>
+        </p:spPr>
+        <p:txBody>
+          <a:bodyPr wrap="none" rtlCol="0">
+            <a:spAutoFit/>
+          </a:bodyPr>
+          <a:lstStyle/>
+          <a:p>
+            <a:r>
+              <a:rPr lang="en-US" altLang="ko-KR" sz="2400" dirty="0"/>
+              <a:t>IND-CPA</a:t>
+            </a:r>
+            <a:endParaRPr lang="ko-KR" altLang="en-US" sz="2400" dirty="0"/>
+          </a:p>
+        </p:txBody>
+      </p:sp>
+      <p:sp>
+        <p:nvSpPr>
+          <p:cNvPr id="7" name="TextBox 6">
+            <a:extLst>
+              <a:ext uri="{FF2B5EF4-FFF2-40B4-BE49-F238E27FC236}">
+                <a16:creationId xmlns:a16="http://schemas.microsoft.com/office/drawing/2014/main" id="{A5B3996B-AB8A-B72D-31DF-E1269DEB990F}"/>
+              </a:ext>
+            </a:extLst>
+          </p:cNvPr>
+          <p:cNvSpPr txBox="1"/>
+          <p:nvPr/>
+        </p:nvSpPr>
+        <p:spPr>
+          <a:xfrm>
+            <a:off x="5438948" y="3001489"/>
+            <a:ext cx="580608" cy="369332"/>
+          </a:xfrm>
+          <a:prstGeom prst="rect">
+            <a:avLst/>
+          </a:prstGeom>
+          <a:noFill/>
+        </p:spPr>
+        <p:txBody>
+          <a:bodyPr wrap="none" rtlCol="0">
+            <a:spAutoFit/>
+          </a:bodyPr>
+          <a:lstStyle/>
+          <a:p>
+            <a:r>
+              <a:rPr lang="en-US" altLang="ko-KR" dirty="0"/>
+              <a:t>BFV</a:t>
+            </a:r>
+            <a:endParaRPr lang="ko-KR" altLang="en-US" dirty="0"/>
+          </a:p>
+        </p:txBody>
+      </p:sp>
+      <p:sp>
+        <p:nvSpPr>
+          <p:cNvPr id="8" name="TextBox 7">
+            <a:extLst>
+              <a:ext uri="{FF2B5EF4-FFF2-40B4-BE49-F238E27FC236}">
+                <a16:creationId xmlns:a16="http://schemas.microsoft.com/office/drawing/2014/main" id="{4DC36CEC-7DF2-06C4-6728-B6413ADD048A}"/>
+              </a:ext>
+            </a:extLst>
+          </p:cNvPr>
+          <p:cNvSpPr txBox="1"/>
+          <p:nvPr/>
+        </p:nvSpPr>
+        <p:spPr>
+          <a:xfrm>
+            <a:off x="4245999" y="3255518"/>
+            <a:ext cx="561372" cy="369332"/>
+          </a:xfrm>
+          <a:prstGeom prst="rect">
+            <a:avLst/>
+          </a:prstGeom>
+          <a:noFill/>
+        </p:spPr>
+        <p:txBody>
+          <a:bodyPr wrap="none" rtlCol="0">
+            <a:spAutoFit/>
+          </a:bodyPr>
+          <a:lstStyle/>
+          <a:p>
+            <a:r>
+              <a:rPr lang="en-US" altLang="ko-KR" dirty="0"/>
+              <a:t>DM</a:t>
+            </a:r>
+            <a:endParaRPr lang="ko-KR" altLang="en-US" dirty="0"/>
+          </a:p>
+        </p:txBody>
+      </p:sp>
+      <p:sp>
+        <p:nvSpPr>
+          <p:cNvPr id="11" name="TextBox 10">
+            <a:extLst>
+              <a:ext uri="{FF2B5EF4-FFF2-40B4-BE49-F238E27FC236}">
+                <a16:creationId xmlns:a16="http://schemas.microsoft.com/office/drawing/2014/main" id="{751351A7-958E-DB2C-A117-7E2859A8E0DD}"/>
+              </a:ext>
+            </a:extLst>
+          </p:cNvPr>
+          <p:cNvSpPr txBox="1"/>
+          <p:nvPr/>
+        </p:nvSpPr>
+        <p:spPr>
+          <a:xfrm>
+            <a:off x="5121783" y="3789837"/>
+            <a:ext cx="710194" cy="369332"/>
+          </a:xfrm>
+          <a:prstGeom prst="rect">
+            <a:avLst/>
+          </a:prstGeom>
+          <a:noFill/>
+        </p:spPr>
+        <p:txBody>
+          <a:bodyPr wrap="none" rtlCol="0">
+            <a:spAutoFit/>
+          </a:bodyPr>
+          <a:lstStyle/>
+          <a:p>
+            <a:r>
+              <a:rPr lang="en-US" altLang="ko-KR" dirty="0"/>
+              <a:t>CGGI</a:t>
+            </a:r>
+            <a:endParaRPr lang="ko-KR" altLang="en-US" dirty="0"/>
+          </a:p>
+        </p:txBody>
+      </p:sp>
+      <p:sp>
+        <p:nvSpPr>
+          <p:cNvPr id="12" name="TextBox 11">
+            <a:extLst>
+              <a:ext uri="{FF2B5EF4-FFF2-40B4-BE49-F238E27FC236}">
+                <a16:creationId xmlns:a16="http://schemas.microsoft.com/office/drawing/2014/main" id="{464B451F-28C3-4C28-3735-2E07F83CA9AA}"/>
+              </a:ext>
+            </a:extLst>
+          </p:cNvPr>
+          <p:cNvSpPr txBox="1"/>
+          <p:nvPr/>
+        </p:nvSpPr>
+        <p:spPr>
+          <a:xfrm>
+            <a:off x="6467495" y="3589252"/>
+            <a:ext cx="623825" cy="369332"/>
+          </a:xfrm>
+          <a:prstGeom prst="rect">
+            <a:avLst/>
+          </a:prstGeom>
+          <a:noFill/>
+        </p:spPr>
+        <p:txBody>
+          <a:bodyPr wrap="none" rtlCol="0">
+            <a:spAutoFit/>
+          </a:bodyPr>
+          <a:lstStyle/>
+          <a:p>
+            <a:r>
+              <a:rPr lang="en-US" altLang="ko-KR" dirty="0"/>
+              <a:t>BGV</a:t>
+            </a:r>
+            <a:endParaRPr lang="ko-KR" altLang="en-US" dirty="0"/>
+          </a:p>
+        </p:txBody>
+      </p:sp>
+      <mc:AlternateContent xmlns:mc="http://schemas.openxmlformats.org/markup-compatibility/2006" xmlns:a14="http://schemas.microsoft.com/office/drawing/2010/main">
+        <mc:Choice Requires="a14">
+          <p:sp>
+            <p:nvSpPr>
+              <p:cNvPr id="5" name="TextBox 4">
+                <a:extLst>
+                  <a:ext uri="{FF2B5EF4-FFF2-40B4-BE49-F238E27FC236}">
+                    <a16:creationId xmlns:a16="http://schemas.microsoft.com/office/drawing/2014/main" id="{395E0226-187C-F0EA-662B-2E49644B7F45}"/>
+                  </a:ext>
+                </a:extLst>
+              </p:cNvPr>
+              <p:cNvSpPr txBox="1"/>
+              <p:nvPr/>
+            </p:nvSpPr>
+            <p:spPr>
+              <a:xfrm>
+                <a:off x="4768728" y="2096872"/>
+                <a:ext cx="1959126" cy="539700"/>
+              </a:xfrm>
+              <a:prstGeom prst="rect">
+                <a:avLst/>
+              </a:prstGeom>
+              <a:solidFill>
+                <a:schemeClr val="bg1"/>
+              </a:solidFill>
+            </p:spPr>
+            <p:txBody>
+              <a:bodyPr wrap="none" rtlCol="0">
+                <a:spAutoFit/>
+              </a:bodyPr>
+              <a:lstStyle/>
+              <a:p>
+                <a:pPr/>
+                <a14:m>
+                  <m:oMathPara xmlns:m="http://schemas.openxmlformats.org/officeDocument/2006/math">
+                    <m:oMathParaPr>
+                      <m:jc m:val="centerGroup"/>
+                    </m:oMathParaPr>
+                    <m:oMath xmlns:m="http://schemas.openxmlformats.org/officeDocument/2006/math">
+                      <m:sSup>
+                        <m:sSupPr>
+                          <m:ctrlPr>
+                            <a:rPr lang="en-US" altLang="ko-KR" sz="2400" b="0" i="1" smtClean="0">
+                              <a:latin typeface="Cambria Math" panose="02040503050406030204" pitchFamily="18" charset="0"/>
+                            </a:rPr>
+                          </m:ctrlPr>
+                        </m:sSupPr>
+                        <m:e>
+                          <m:r>
+                            <m:rPr>
+                              <m:nor/>
+                            </m:rPr>
+                            <a:rPr lang="en-US" altLang="ko-KR" sz="2400" dirty="0"/>
+                            <m:t>IND</m:t>
+                          </m:r>
+                          <m:r>
+                            <m:rPr>
+                              <m:nor/>
+                            </m:rPr>
+                            <a:rPr lang="en-US" altLang="ko-KR" sz="2400" dirty="0"/>
+                            <m:t>−</m:t>
+                          </m:r>
+                          <m:r>
+                            <m:rPr>
+                              <m:nor/>
+                            </m:rPr>
+                            <a:rPr lang="en-US" altLang="ko-KR" sz="2400" dirty="0"/>
+                            <m:t>CPA</m:t>
+                          </m:r>
+                          <m:r>
+                            <m:rPr>
+                              <m:nor/>
+                            </m:rPr>
+                            <a:rPr lang="ko-KR" altLang="en-US" sz="2400" dirty="0"/>
+                            <m:t> </m:t>
+                          </m:r>
+                        </m:e>
+                        <m:sup>
+                          <m:r>
+                            <m:rPr>
+                              <m:nor/>
+                            </m:rPr>
+                            <a:rPr lang="en-US" altLang="ko-KR" sz="2400" dirty="0"/>
+                            <m:t>D</m:t>
+                          </m:r>
+                        </m:sup>
+                      </m:sSup>
+                      <m:r>
+                        <a:rPr lang="en-US" altLang="ko-KR" sz="2400" b="0" i="1" smtClean="0">
+                          <a:latin typeface="Cambria Math" panose="02040503050406030204" pitchFamily="18" charset="0"/>
+                        </a:rPr>
+                        <m:t> </m:t>
+                      </m:r>
+                    </m:oMath>
+                  </m:oMathPara>
+                </a14:m>
+                <a:endParaRPr lang="ko-KR" altLang="en-US" sz="2400" dirty="0"/>
+              </a:p>
+            </p:txBody>
+          </p:sp>
+        </mc:Choice>
+        <mc:Fallback xmlns="">
+          <p:sp>
+            <p:nvSpPr>
+              <p:cNvPr id="5" name="TextBox 4">
+                <a:extLst>
+                  <a:ext uri="{FF2B5EF4-FFF2-40B4-BE49-F238E27FC236}">
+                    <a16:creationId xmlns:a16="http://schemas.microsoft.com/office/drawing/2014/main" id="{395E0226-187C-F0EA-662B-2E49644B7F45}"/>
+                  </a:ext>
+                </a:extLst>
+              </p:cNvPr>
+              <p:cNvSpPr txBox="1">
+                <a:spLocks noRot="1" noChangeAspect="1" noMove="1" noResize="1" noEditPoints="1" noAdjustHandles="1" noChangeArrowheads="1" noChangeShapeType="1" noTextEdit="1"/>
+              </p:cNvSpPr>
+              <p:nvPr/>
+            </p:nvSpPr>
+            <p:spPr>
+              <a:xfrm>
+                <a:off x="4768728" y="2096872"/>
+                <a:ext cx="1959126" cy="539700"/>
+              </a:xfrm>
+              <a:prstGeom prst="rect">
+                <a:avLst/>
+              </a:prstGeom>
+              <a:blipFill>
+                <a:blip r:embed="rId2"/>
+                <a:stretch>
+                  <a:fillRect/>
+                </a:stretch>
+              </a:blipFill>
+            </p:spPr>
+            <p:txBody>
+              <a:bodyPr/>
+              <a:lstStyle/>
+              <a:p>
+                <a:r>
+                  <a:rPr lang="ko-KR" altLang="en-US">
+                    <a:noFill/>
+                  </a:rPr>
+                  <a:t> </a:t>
+                </a:r>
+              </a:p>
+            </p:txBody>
+          </p:sp>
+        </mc:Fallback>
+      </mc:AlternateContent>
+      <mc:AlternateContent xmlns:mc="http://schemas.openxmlformats.org/markup-compatibility/2006" xmlns:a14="http://schemas.microsoft.com/office/drawing/2010/main">
+        <mc:Choice Requires="a14">
+          <p:sp>
+            <p:nvSpPr>
+              <p:cNvPr id="13" name="TextBox 12">
+                <a:extLst>
+                  <a:ext uri="{FF2B5EF4-FFF2-40B4-BE49-F238E27FC236}">
+                    <a16:creationId xmlns:a16="http://schemas.microsoft.com/office/drawing/2014/main" id="{55FD2AAA-089E-5E47-3209-E64E4B5CF151}"/>
+                  </a:ext>
+                </a:extLst>
+              </p:cNvPr>
+              <p:cNvSpPr txBox="1"/>
+              <p:nvPr/>
+            </p:nvSpPr>
+            <p:spPr>
+              <a:xfrm>
+                <a:off x="6469226" y="2640675"/>
+                <a:ext cx="1244187" cy="704873"/>
+              </a:xfrm>
+              <a:prstGeom prst="rect">
+                <a:avLst/>
+              </a:prstGeom>
+              <a:noFill/>
+            </p:spPr>
+            <p:txBody>
+              <a:bodyPr wrap="none" rtlCol="0">
+                <a:spAutoFit/>
+              </a:bodyPr>
+              <a:lstStyle/>
+              <a:p>
+                <a:pPr/>
+                <a14:m>
+                  <m:oMathPara xmlns:m="http://schemas.openxmlformats.org/officeDocument/2006/math">
+                    <m:oMathParaPr>
+                      <m:jc m:val="centerGroup"/>
+                    </m:oMathParaPr>
+                    <m:oMath xmlns:m="http://schemas.openxmlformats.org/officeDocument/2006/math">
+                      <m:sSup>
+                        <m:sSupPr>
+                          <m:ctrlPr>
+                            <a:rPr lang="en-US" altLang="ko-KR" b="0" i="1" smtClean="0">
+                              <a:latin typeface="Cambria Math" panose="02040503050406030204" pitchFamily="18" charset="0"/>
+                            </a:rPr>
+                          </m:ctrlPr>
+                        </m:sSupPr>
+                        <m:e>
+                          <m:r>
+                            <m:rPr>
+                              <m:nor/>
+                            </m:rPr>
+                            <a:rPr lang="en-US" altLang="ko-KR" dirty="0"/>
+                            <m:t>CKKS</m:t>
+                          </m:r>
+                        </m:e>
+                        <m:sup>
+                          <m:r>
+                            <m:rPr>
+                              <m:nor/>
+                            </m:rPr>
+                            <a:rPr lang="en-US" altLang="ko-KR" dirty="0"/>
+                            <m:t>D</m:t>
+                          </m:r>
+                          <m:r>
+                            <m:rPr>
+                              <m:nor/>
+                            </m:rPr>
+                            <a:rPr lang="en-US" altLang="ko-KR" b="0" i="0" dirty="0" smtClean="0"/>
+                            <m:t>P</m:t>
+                          </m:r>
+                        </m:sup>
+                      </m:sSup>
+                      <m:r>
+                        <a:rPr lang="en-US" altLang="ko-KR" b="0" i="1" smtClean="0">
+                          <a:latin typeface="Cambria Math" panose="02040503050406030204" pitchFamily="18" charset="0"/>
+                        </a:rPr>
+                        <m:t> </m:t>
+                      </m:r>
+                    </m:oMath>
+                  </m:oMathPara>
+                </a14:m>
+                <a:endParaRPr lang="ko-KR" altLang="en-US" dirty="0"/>
+              </a:p>
+              <a:p>
+                <a:endParaRPr lang="ko-KR" altLang="en-US" dirty="0"/>
+              </a:p>
+            </p:txBody>
+          </p:sp>
+        </mc:Choice>
+        <mc:Fallback xmlns="">
+          <p:sp>
+            <p:nvSpPr>
+              <p:cNvPr id="13" name="TextBox 12">
+                <a:extLst>
+                  <a:ext uri="{FF2B5EF4-FFF2-40B4-BE49-F238E27FC236}">
+                    <a16:creationId xmlns:a16="http://schemas.microsoft.com/office/drawing/2014/main" id="{55FD2AAA-089E-5E47-3209-E64E4B5CF151}"/>
+                  </a:ext>
+                </a:extLst>
+              </p:cNvPr>
+              <p:cNvSpPr txBox="1">
+                <a:spLocks noRot="1" noChangeAspect="1" noMove="1" noResize="1" noEditPoints="1" noAdjustHandles="1" noChangeArrowheads="1" noChangeShapeType="1" noTextEdit="1"/>
+              </p:cNvSpPr>
+              <p:nvPr/>
+            </p:nvSpPr>
+            <p:spPr>
+              <a:xfrm>
+                <a:off x="6469226" y="2640675"/>
+                <a:ext cx="1244187" cy="704873"/>
+              </a:xfrm>
+              <a:prstGeom prst="rect">
+                <a:avLst/>
+              </a:prstGeom>
+              <a:blipFill>
+                <a:blip r:embed="rId3"/>
+                <a:stretch>
+                  <a:fillRect/>
+                </a:stretch>
+              </a:blipFill>
+            </p:spPr>
+            <p:txBody>
+              <a:bodyPr/>
+              <a:lstStyle/>
+              <a:p>
+                <a:r>
+                  <a:rPr lang="ko-KR" altLang="en-US">
+                    <a:noFill/>
+                  </a:rPr>
+                  <a:t> </a:t>
+                </a:r>
+              </a:p>
+            </p:txBody>
+          </p:sp>
+        </mc:Fallback>
+      </mc:AlternateContent>
+      <p:sp>
+        <p:nvSpPr>
+          <p:cNvPr id="17" name="번개 16">
+            <a:extLst>
+              <a:ext uri="{FF2B5EF4-FFF2-40B4-BE49-F238E27FC236}">
+                <a16:creationId xmlns:a16="http://schemas.microsoft.com/office/drawing/2014/main" id="{64DEA46B-96D6-607E-A42A-F28F5EA4F684}"/>
+              </a:ext>
+            </a:extLst>
+          </p:cNvPr>
+          <p:cNvSpPr/>
+          <p:nvPr/>
+        </p:nvSpPr>
+        <p:spPr>
+          <a:xfrm flipH="1">
+            <a:off x="7086752" y="1340528"/>
+            <a:ext cx="1244187" cy="1300147"/>
+          </a:xfrm>
+          <a:prstGeom prst="lightningBolt">
+            <a:avLst/>
+          </a:prstGeom>
+          <a:ln>
+            <a:solidFill>
+              <a:srgbClr val="FFFF00"/>
+            </a:solidFill>
+          </a:ln>
+        </p:spPr>
+        <p:style>
+          <a:lnRef idx="2">
+            <a:schemeClr val="accent4">
+              <a:shade val="15000"/>
+            </a:schemeClr>
+          </a:lnRef>
+          <a:fillRef idx="1">
+            <a:schemeClr val="accent4"/>
+          </a:fillRef>
+          <a:effectRef idx="0">
+            <a:schemeClr val="accent4"/>
+          </a:effectRef>
+          <a:fontRef idx="minor">
+            <a:schemeClr val="lt1"/>
+          </a:fontRef>
+        </p:style>
+        <p:txBody>
+          <a:bodyPr rtlCol="0" anchor="ctr"/>
+          <a:lstStyle/>
+          <a:p>
+            <a:pPr algn="ctr"/>
+            <a:endParaRPr lang="ko-KR" altLang="en-US"/>
+          </a:p>
+        </p:txBody>
+      </p:sp>
+      <p:sp>
+        <p:nvSpPr>
+          <p:cNvPr id="18" name="TextBox 17">
+            <a:extLst>
+              <a:ext uri="{FF2B5EF4-FFF2-40B4-BE49-F238E27FC236}">
+                <a16:creationId xmlns:a16="http://schemas.microsoft.com/office/drawing/2014/main" id="{FCD296E1-8F8D-8AB9-56C9-99CEC0834D9B}"/>
+              </a:ext>
+            </a:extLst>
+          </p:cNvPr>
+          <p:cNvSpPr txBox="1"/>
+          <p:nvPr/>
+        </p:nvSpPr>
+        <p:spPr>
+          <a:xfrm>
+            <a:off x="7302029" y="861101"/>
+            <a:ext cx="1249060" cy="646331"/>
+          </a:xfrm>
+          <a:prstGeom prst="rect">
+            <a:avLst/>
+          </a:prstGeom>
+          <a:noFill/>
+        </p:spPr>
+        <p:txBody>
+          <a:bodyPr wrap="none" rtlCol="0">
+            <a:spAutoFit/>
+          </a:bodyPr>
+          <a:lstStyle/>
+          <a:p>
+            <a:r>
+              <a:rPr lang="en-US" altLang="ko-KR" b="0" i="0" dirty="0">
+                <a:effectLst/>
+                <a:latin typeface="Arial" panose="020B0604020202020204" pitchFamily="34" charset="0"/>
+              </a:rPr>
+              <a:t>Guo et al. </a:t>
+            </a:r>
+          </a:p>
+          <a:p>
+            <a:r>
+              <a:rPr lang="en-US" altLang="ko-KR" b="0" i="0" dirty="0">
+                <a:effectLst/>
+                <a:latin typeface="Arial" panose="020B0604020202020204" pitchFamily="34" charset="0"/>
+              </a:rPr>
+              <a:t>[GNSJ24]</a:t>
+            </a:r>
+            <a:endParaRPr lang="ko-KR" altLang="en-US" dirty="0"/>
+          </a:p>
+        </p:txBody>
+      </p:sp>
+      <p:sp>
+        <p:nvSpPr>
+          <p:cNvPr id="19" name="타원 18">
+            <a:extLst>
+              <a:ext uri="{FF2B5EF4-FFF2-40B4-BE49-F238E27FC236}">
+                <a16:creationId xmlns:a16="http://schemas.microsoft.com/office/drawing/2014/main" id="{F2A043EF-21AA-3051-E210-8ACA290252A7}"/>
+              </a:ext>
+            </a:extLst>
+          </p:cNvPr>
+          <p:cNvSpPr/>
+          <p:nvPr/>
+        </p:nvSpPr>
+        <p:spPr>
+          <a:xfrm>
+            <a:off x="6480111" y="2563909"/>
+            <a:ext cx="1089386" cy="600114"/>
+          </a:xfrm>
+          <a:prstGeom prst="ellipse">
+            <a:avLst/>
+          </a:prstGeom>
+          <a:noFill/>
+          <a:ln>
+            <a:solidFill>
+              <a:srgbClr val="FFC000"/>
+            </a:solidFill>
+          </a:ln>
+        </p:spPr>
+        <p:style>
+          <a:lnRef idx="2">
+            <a:schemeClr val="accent1">
+              <a:shade val="15000"/>
+            </a:schemeClr>
+          </a:lnRef>
+          <a:fillRef idx="1">
+            <a:schemeClr val="accent1"/>
+          </a:fillRef>
+          <a:effectRef idx="0">
+            <a:schemeClr val="accent1"/>
+          </a:effectRef>
+          <a:fontRef idx="minor">
+            <a:schemeClr val="lt1"/>
+          </a:fontRef>
+        </p:style>
+        <p:txBody>
+          <a:bodyPr rtlCol="0" anchor="ctr"/>
+          <a:lstStyle/>
+          <a:p>
+            <a:pPr algn="ctr"/>
+            <a:endParaRPr lang="ko-KR" altLang="en-US"/>
+          </a:p>
+        </p:txBody>
+      </p:sp>
+    </p:spTree>
+    <p:extLst>
+      <p:ext uri="{BB962C8B-B14F-4D97-AF65-F5344CB8AC3E}">
+        <p14:creationId xmlns:p14="http://schemas.microsoft.com/office/powerpoint/2010/main" val="675151191"/>
+      </p:ext>
+    </p:extLst>
+  </p:cSld>
+  <p:clrMapOvr>
+    <a:masterClrMapping/>
+  </p:clrMapOvr>
+</p:sld>
+</file>
+
+<file path=ppt/slides/slide4.xml><?xml version="1.0" encoding="utf-8"?>
+<p:sld xmlns:a="http://schemas.openxmlformats.org/drawingml/2006/main" xmlns:r="http://schemas.openxmlformats.org/officeDocument/2006/relationships" xmlns:p="http://schemas.openxmlformats.org/presentationml/2006/main">
+  <p:cSld>
+    <p:spTree>
+      <p:nvGrpSpPr>
+        <p:cNvPr id="1" name=""/>
+        <p:cNvGrpSpPr/>
+        <p:nvPr/>
+      </p:nvGrpSpPr>
+      <p:grpSpPr>
+        <a:xfrm>
+          <a:off x="0" y="0"/>
+          <a:ext cx="0" cy="0"/>
+          <a:chOff x="0" y="0"/>
+          <a:chExt cx="0" cy="0"/>
+        </a:xfrm>
+      </p:grpSpPr>
+      <p:sp>
+        <p:nvSpPr>
+          <p:cNvPr id="2" name="사각형: 둥근 모서리 1">
+            <a:extLst>
+              <a:ext uri="{FF2B5EF4-FFF2-40B4-BE49-F238E27FC236}">
+                <a16:creationId xmlns:a16="http://schemas.microsoft.com/office/drawing/2014/main" id="{A39E7710-6120-179B-96ED-7F9567BAC403}"/>
+              </a:ext>
+            </a:extLst>
+          </p:cNvPr>
+          <p:cNvSpPr/>
+          <p:nvPr/>
+        </p:nvSpPr>
+        <p:spPr>
+          <a:xfrm>
+            <a:off x="3062796" y="1793289"/>
+            <a:ext cx="6409678" cy="3222594"/>
+          </a:xfrm>
+          <a:prstGeom prst="roundRect">
+            <a:avLst/>
+          </a:prstGeom>
+        </p:spPr>
+        <p:style>
+          <a:lnRef idx="2">
+            <a:schemeClr val="dk1"/>
+          </a:lnRef>
+          <a:fillRef idx="1">
+            <a:schemeClr val="lt1"/>
+          </a:fillRef>
+          <a:effectRef idx="0">
+            <a:schemeClr val="dk1"/>
+          </a:effectRef>
+          <a:fontRef idx="minor">
+            <a:schemeClr val="dk1"/>
+          </a:fontRef>
+        </p:style>
+        <p:txBody>
+          <a:bodyPr rtlCol="0" anchor="ctr"/>
+          <a:lstStyle/>
+          <a:p>
+            <a:pPr algn="ctr"/>
+            <a:endParaRPr lang="ko-KR" altLang="en-US"/>
+          </a:p>
+        </p:txBody>
+      </p:sp>
+      <p:sp>
+        <p:nvSpPr>
+          <p:cNvPr id="3" name="사각형: 둥근 모서리 2">
+            <a:extLst>
+              <a:ext uri="{FF2B5EF4-FFF2-40B4-BE49-F238E27FC236}">
+                <a16:creationId xmlns:a16="http://schemas.microsoft.com/office/drawing/2014/main" id="{BBD0439B-3FCA-74A6-321E-3309EF828BFE}"/>
+              </a:ext>
+            </a:extLst>
+          </p:cNvPr>
+          <p:cNvSpPr/>
+          <p:nvPr/>
+        </p:nvSpPr>
+        <p:spPr>
+          <a:xfrm>
+            <a:off x="3684233" y="2396971"/>
+            <a:ext cx="4128117" cy="2121763"/>
+          </a:xfrm>
+          <a:prstGeom prst="roundRect">
+            <a:avLst/>
+          </a:prstGeom>
+        </p:spPr>
+        <p:style>
+          <a:lnRef idx="2">
+            <a:schemeClr val="dk1"/>
+          </a:lnRef>
+          <a:fillRef idx="1">
+            <a:schemeClr val="lt1"/>
+          </a:fillRef>
+          <a:effectRef idx="0">
+            <a:schemeClr val="dk1"/>
+          </a:effectRef>
+          <a:fontRef idx="minor">
+            <a:schemeClr val="dk1"/>
+          </a:fontRef>
+        </p:style>
+        <p:txBody>
+          <a:bodyPr rtlCol="0" anchor="ctr"/>
+          <a:lstStyle/>
+          <a:p>
+            <a:pPr algn="ctr"/>
+            <a:endParaRPr lang="ko-KR" altLang="en-US" dirty="0"/>
+          </a:p>
+        </p:txBody>
+      </p:sp>
+      <p:sp>
+        <p:nvSpPr>
+          <p:cNvPr id="4" name="TextBox 3">
+            <a:extLst>
+              <a:ext uri="{FF2B5EF4-FFF2-40B4-BE49-F238E27FC236}">
+                <a16:creationId xmlns:a16="http://schemas.microsoft.com/office/drawing/2014/main" id="{F579A72D-7DEB-C015-A8DF-BCE5AB65AF06}"/>
+              </a:ext>
+            </a:extLst>
+          </p:cNvPr>
+          <p:cNvSpPr txBox="1"/>
+          <p:nvPr/>
+        </p:nvSpPr>
+        <p:spPr>
+          <a:xfrm>
+            <a:off x="8300449" y="2212305"/>
+            <a:ext cx="728084" cy="369332"/>
+          </a:xfrm>
+          <a:prstGeom prst="rect">
+            <a:avLst/>
+          </a:prstGeom>
+          <a:noFill/>
+        </p:spPr>
+        <p:txBody>
+          <a:bodyPr wrap="none" rtlCol="0">
+            <a:spAutoFit/>
+          </a:bodyPr>
+          <a:lstStyle/>
+          <a:p>
+            <a:r>
+              <a:rPr lang="en-US" altLang="ko-KR" dirty="0"/>
+              <a:t>CKKS</a:t>
+            </a:r>
+            <a:endParaRPr lang="ko-KR" altLang="en-US" dirty="0"/>
+          </a:p>
+        </p:txBody>
+      </p:sp>
+      <p:sp>
+        <p:nvSpPr>
+          <p:cNvPr id="6" name="TextBox 5">
+            <a:extLst>
+              <a:ext uri="{FF2B5EF4-FFF2-40B4-BE49-F238E27FC236}">
+                <a16:creationId xmlns:a16="http://schemas.microsoft.com/office/drawing/2014/main" id="{17FF1272-F4AE-AE7D-A957-3BF3AABF0F0A}"/>
+              </a:ext>
+            </a:extLst>
+          </p:cNvPr>
+          <p:cNvSpPr txBox="1"/>
+          <p:nvPr/>
+        </p:nvSpPr>
+        <p:spPr>
+          <a:xfrm>
+            <a:off x="5567796" y="1531358"/>
+            <a:ext cx="1399679" cy="461665"/>
+          </a:xfrm>
+          <a:prstGeom prst="rect">
+            <a:avLst/>
+          </a:prstGeom>
+          <a:solidFill>
+            <a:schemeClr val="bg1"/>
+          </a:solidFill>
+        </p:spPr>
+        <p:txBody>
+          <a:bodyPr wrap="none" rtlCol="0">
+            <a:spAutoFit/>
+          </a:bodyPr>
+          <a:lstStyle/>
+          <a:p>
+            <a:r>
+              <a:rPr lang="en-US" altLang="ko-KR" sz="2400" dirty="0"/>
+              <a:t>IND-CPA</a:t>
+            </a:r>
+            <a:endParaRPr lang="ko-KR" altLang="en-US" sz="2400" dirty="0"/>
+          </a:p>
+        </p:txBody>
+      </p:sp>
+      <p:sp>
+        <p:nvSpPr>
+          <p:cNvPr id="7" name="TextBox 6">
+            <a:extLst>
+              <a:ext uri="{FF2B5EF4-FFF2-40B4-BE49-F238E27FC236}">
+                <a16:creationId xmlns:a16="http://schemas.microsoft.com/office/drawing/2014/main" id="{A5B3996B-AB8A-B72D-31DF-E1269DEB990F}"/>
+              </a:ext>
+            </a:extLst>
+          </p:cNvPr>
+          <p:cNvSpPr txBox="1"/>
+          <p:nvPr/>
+        </p:nvSpPr>
+        <p:spPr>
+          <a:xfrm>
+            <a:off x="5438948" y="3001489"/>
+            <a:ext cx="580608" cy="369332"/>
+          </a:xfrm>
+          <a:prstGeom prst="rect">
+            <a:avLst/>
+          </a:prstGeom>
+          <a:noFill/>
+        </p:spPr>
+        <p:txBody>
+          <a:bodyPr wrap="none" rtlCol="0">
+            <a:spAutoFit/>
+          </a:bodyPr>
+          <a:lstStyle/>
+          <a:p>
+            <a:r>
+              <a:rPr lang="en-US" altLang="ko-KR" dirty="0"/>
+              <a:t>BFV</a:t>
+            </a:r>
+            <a:endParaRPr lang="ko-KR" altLang="en-US" dirty="0"/>
+          </a:p>
+        </p:txBody>
+      </p:sp>
+      <p:sp>
+        <p:nvSpPr>
+          <p:cNvPr id="8" name="TextBox 7">
+            <a:extLst>
+              <a:ext uri="{FF2B5EF4-FFF2-40B4-BE49-F238E27FC236}">
+                <a16:creationId xmlns:a16="http://schemas.microsoft.com/office/drawing/2014/main" id="{4DC36CEC-7DF2-06C4-6728-B6413ADD048A}"/>
+              </a:ext>
+            </a:extLst>
+          </p:cNvPr>
+          <p:cNvSpPr txBox="1"/>
+          <p:nvPr/>
+        </p:nvSpPr>
+        <p:spPr>
+          <a:xfrm>
+            <a:off x="4245999" y="3255518"/>
+            <a:ext cx="561372" cy="369332"/>
+          </a:xfrm>
+          <a:prstGeom prst="rect">
+            <a:avLst/>
+          </a:prstGeom>
+          <a:noFill/>
+        </p:spPr>
+        <p:txBody>
+          <a:bodyPr wrap="none" rtlCol="0">
+            <a:spAutoFit/>
+          </a:bodyPr>
+          <a:lstStyle/>
+          <a:p>
+            <a:r>
+              <a:rPr lang="en-US" altLang="ko-KR" dirty="0"/>
+              <a:t>DM</a:t>
+            </a:r>
+            <a:endParaRPr lang="ko-KR" altLang="en-US" dirty="0"/>
+          </a:p>
+        </p:txBody>
+      </p:sp>
+      <p:sp>
+        <p:nvSpPr>
+          <p:cNvPr id="11" name="TextBox 10">
+            <a:extLst>
+              <a:ext uri="{FF2B5EF4-FFF2-40B4-BE49-F238E27FC236}">
+                <a16:creationId xmlns:a16="http://schemas.microsoft.com/office/drawing/2014/main" id="{751351A7-958E-DB2C-A117-7E2859A8E0DD}"/>
+              </a:ext>
+            </a:extLst>
+          </p:cNvPr>
+          <p:cNvSpPr txBox="1"/>
+          <p:nvPr/>
+        </p:nvSpPr>
+        <p:spPr>
+          <a:xfrm>
+            <a:off x="5121783" y="3789837"/>
+            <a:ext cx="710194" cy="369332"/>
+          </a:xfrm>
+          <a:prstGeom prst="rect">
+            <a:avLst/>
+          </a:prstGeom>
+          <a:noFill/>
+        </p:spPr>
+        <p:txBody>
+          <a:bodyPr wrap="none" rtlCol="0">
+            <a:spAutoFit/>
+          </a:bodyPr>
+          <a:lstStyle/>
+          <a:p>
+            <a:r>
+              <a:rPr lang="en-US" altLang="ko-KR" dirty="0"/>
+              <a:t>CGGI</a:t>
+            </a:r>
+            <a:endParaRPr lang="ko-KR" altLang="en-US" dirty="0"/>
+          </a:p>
+        </p:txBody>
+      </p:sp>
+      <p:sp>
+        <p:nvSpPr>
+          <p:cNvPr id="12" name="TextBox 11">
+            <a:extLst>
+              <a:ext uri="{FF2B5EF4-FFF2-40B4-BE49-F238E27FC236}">
+                <a16:creationId xmlns:a16="http://schemas.microsoft.com/office/drawing/2014/main" id="{464B451F-28C3-4C28-3735-2E07F83CA9AA}"/>
+              </a:ext>
+            </a:extLst>
+          </p:cNvPr>
+          <p:cNvSpPr txBox="1"/>
+          <p:nvPr/>
+        </p:nvSpPr>
+        <p:spPr>
+          <a:xfrm>
+            <a:off x="6467495" y="3589252"/>
+            <a:ext cx="623825" cy="369332"/>
+          </a:xfrm>
+          <a:prstGeom prst="rect">
+            <a:avLst/>
+          </a:prstGeom>
+          <a:noFill/>
+        </p:spPr>
+        <p:txBody>
+          <a:bodyPr wrap="none" rtlCol="0">
+            <a:spAutoFit/>
+          </a:bodyPr>
+          <a:lstStyle/>
+          <a:p>
+            <a:r>
+              <a:rPr lang="en-US" altLang="ko-KR" dirty="0"/>
+              <a:t>BGV</a:t>
+            </a:r>
+            <a:endParaRPr lang="ko-KR" altLang="en-US" dirty="0"/>
+          </a:p>
+        </p:txBody>
+      </p:sp>
+      <mc:AlternateContent xmlns:mc="http://schemas.openxmlformats.org/markup-compatibility/2006" xmlns:a14="http://schemas.microsoft.com/office/drawing/2010/main">
+        <mc:Choice Requires="a14">
+          <p:sp>
+            <p:nvSpPr>
+              <p:cNvPr id="5" name="TextBox 4">
+                <a:extLst>
+                  <a:ext uri="{FF2B5EF4-FFF2-40B4-BE49-F238E27FC236}">
+                    <a16:creationId xmlns:a16="http://schemas.microsoft.com/office/drawing/2014/main" id="{395E0226-187C-F0EA-662B-2E49644B7F45}"/>
+                  </a:ext>
+                </a:extLst>
+              </p:cNvPr>
+              <p:cNvSpPr txBox="1"/>
+              <p:nvPr/>
+            </p:nvSpPr>
+            <p:spPr>
+              <a:xfrm>
+                <a:off x="4768728" y="2096872"/>
+                <a:ext cx="1959126" cy="539700"/>
+              </a:xfrm>
+              <a:prstGeom prst="rect">
+                <a:avLst/>
+              </a:prstGeom>
+              <a:solidFill>
+                <a:schemeClr val="bg1"/>
+              </a:solidFill>
+            </p:spPr>
+            <p:txBody>
+              <a:bodyPr wrap="none" rtlCol="0">
+                <a:spAutoFit/>
+              </a:bodyPr>
+              <a:lstStyle/>
+              <a:p>
+                <a:pPr/>
+                <a14:m>
+                  <m:oMathPara xmlns:m="http://schemas.openxmlformats.org/officeDocument/2006/math">
+                    <m:oMathParaPr>
+                      <m:jc m:val="centerGroup"/>
+                    </m:oMathParaPr>
+                    <m:oMath xmlns:m="http://schemas.openxmlformats.org/officeDocument/2006/math">
+                      <m:sSup>
+                        <m:sSupPr>
+                          <m:ctrlPr>
+                            <a:rPr lang="en-US" altLang="ko-KR" sz="2400" b="0" i="1" smtClean="0">
+                              <a:latin typeface="Cambria Math" panose="02040503050406030204" pitchFamily="18" charset="0"/>
+                            </a:rPr>
+                          </m:ctrlPr>
+                        </m:sSupPr>
+                        <m:e>
+                          <m:r>
+                            <m:rPr>
+                              <m:nor/>
+                            </m:rPr>
+                            <a:rPr lang="en-US" altLang="ko-KR" sz="2400" dirty="0"/>
+                            <m:t>IND</m:t>
+                          </m:r>
+                          <m:r>
+                            <m:rPr>
+                              <m:nor/>
+                            </m:rPr>
+                            <a:rPr lang="en-US" altLang="ko-KR" sz="2400" dirty="0"/>
+                            <m:t>−</m:t>
+                          </m:r>
+                          <m:r>
+                            <m:rPr>
+                              <m:nor/>
+                            </m:rPr>
+                            <a:rPr lang="en-US" altLang="ko-KR" sz="2400" dirty="0"/>
+                            <m:t>CPA</m:t>
+                          </m:r>
+                          <m:r>
+                            <m:rPr>
+                              <m:nor/>
+                            </m:rPr>
+                            <a:rPr lang="ko-KR" altLang="en-US" sz="2400" dirty="0"/>
+                            <m:t> </m:t>
+                          </m:r>
+                        </m:e>
+                        <m:sup>
+                          <m:r>
+                            <m:rPr>
+                              <m:nor/>
+                            </m:rPr>
+                            <a:rPr lang="en-US" altLang="ko-KR" sz="2400" dirty="0"/>
+                            <m:t>D</m:t>
+                          </m:r>
+                        </m:sup>
+                      </m:sSup>
+                      <m:r>
+                        <a:rPr lang="en-US" altLang="ko-KR" sz="2400" b="0" i="1" smtClean="0">
+                          <a:latin typeface="Cambria Math" panose="02040503050406030204" pitchFamily="18" charset="0"/>
+                        </a:rPr>
+                        <m:t> </m:t>
+                      </m:r>
+                    </m:oMath>
+                  </m:oMathPara>
+                </a14:m>
+                <a:endParaRPr lang="ko-KR" altLang="en-US" sz="2400" dirty="0"/>
+              </a:p>
+            </p:txBody>
+          </p:sp>
+        </mc:Choice>
+        <mc:Fallback xmlns="">
+          <p:sp>
+            <p:nvSpPr>
+              <p:cNvPr id="5" name="TextBox 4">
+                <a:extLst>
+                  <a:ext uri="{FF2B5EF4-FFF2-40B4-BE49-F238E27FC236}">
+                    <a16:creationId xmlns:a16="http://schemas.microsoft.com/office/drawing/2014/main" id="{395E0226-187C-F0EA-662B-2E49644B7F45}"/>
+                  </a:ext>
+                </a:extLst>
+              </p:cNvPr>
+              <p:cNvSpPr txBox="1">
+                <a:spLocks noRot="1" noChangeAspect="1" noMove="1" noResize="1" noEditPoints="1" noAdjustHandles="1" noChangeArrowheads="1" noChangeShapeType="1" noTextEdit="1"/>
+              </p:cNvSpPr>
+              <p:nvPr/>
+            </p:nvSpPr>
+            <p:spPr>
+              <a:xfrm>
+                <a:off x="4768728" y="2096872"/>
+                <a:ext cx="1959126" cy="539700"/>
+              </a:xfrm>
+              <a:prstGeom prst="rect">
+                <a:avLst/>
+              </a:prstGeom>
+              <a:blipFill>
+                <a:blip r:embed="rId2"/>
+                <a:stretch>
+                  <a:fillRect/>
+                </a:stretch>
+              </a:blipFill>
+            </p:spPr>
+            <p:txBody>
+              <a:bodyPr/>
+              <a:lstStyle/>
+              <a:p>
+                <a:r>
+                  <a:rPr lang="ko-KR" altLang="en-US">
+                    <a:noFill/>
+                  </a:rPr>
+                  <a:t> </a:t>
+                </a:r>
+              </a:p>
+            </p:txBody>
+          </p:sp>
+        </mc:Fallback>
+      </mc:AlternateContent>
+      <mc:AlternateContent xmlns:mc="http://schemas.openxmlformats.org/markup-compatibility/2006" xmlns:a14="http://schemas.microsoft.com/office/drawing/2010/main">
+        <mc:Choice Requires="a14">
+          <p:sp>
+            <p:nvSpPr>
+              <p:cNvPr id="13" name="TextBox 12">
+                <a:extLst>
+                  <a:ext uri="{FF2B5EF4-FFF2-40B4-BE49-F238E27FC236}">
+                    <a16:creationId xmlns:a16="http://schemas.microsoft.com/office/drawing/2014/main" id="{55FD2AAA-089E-5E47-3209-E64E4B5CF151}"/>
+                  </a:ext>
+                </a:extLst>
+              </p:cNvPr>
+              <p:cNvSpPr txBox="1"/>
+              <p:nvPr/>
+            </p:nvSpPr>
+            <p:spPr>
+              <a:xfrm>
+                <a:off x="6469226" y="2640675"/>
+                <a:ext cx="1244187" cy="704873"/>
+              </a:xfrm>
+              <a:prstGeom prst="rect">
+                <a:avLst/>
+              </a:prstGeom>
+              <a:noFill/>
+            </p:spPr>
+            <p:txBody>
+              <a:bodyPr wrap="none" rtlCol="0">
+                <a:spAutoFit/>
+              </a:bodyPr>
+              <a:lstStyle/>
+              <a:p>
+                <a:pPr/>
+                <a14:m>
+                  <m:oMathPara xmlns:m="http://schemas.openxmlformats.org/officeDocument/2006/math">
+                    <m:oMathParaPr>
+                      <m:jc m:val="centerGroup"/>
+                    </m:oMathParaPr>
+                    <m:oMath xmlns:m="http://schemas.openxmlformats.org/officeDocument/2006/math">
+                      <m:sSup>
+                        <m:sSupPr>
+                          <m:ctrlPr>
+                            <a:rPr lang="en-US" altLang="ko-KR" b="0" i="1" smtClean="0">
+                              <a:latin typeface="Cambria Math" panose="02040503050406030204" pitchFamily="18" charset="0"/>
+                            </a:rPr>
+                          </m:ctrlPr>
+                        </m:sSupPr>
+                        <m:e>
+                          <m:r>
+                            <m:rPr>
+                              <m:nor/>
+                            </m:rPr>
+                            <a:rPr lang="en-US" altLang="ko-KR" dirty="0"/>
+                            <m:t>CKKS</m:t>
+                          </m:r>
+                        </m:e>
+                        <m:sup>
+                          <m:r>
+                            <m:rPr>
+                              <m:nor/>
+                            </m:rPr>
+                            <a:rPr lang="en-US" altLang="ko-KR" dirty="0"/>
+                            <m:t>D</m:t>
+                          </m:r>
+                          <m:r>
+                            <m:rPr>
+                              <m:nor/>
+                            </m:rPr>
+                            <a:rPr lang="en-US" altLang="ko-KR" b="0" i="0" dirty="0" smtClean="0"/>
+                            <m:t>P</m:t>
+                          </m:r>
+                        </m:sup>
+                      </m:sSup>
+                      <m:r>
+                        <a:rPr lang="en-US" altLang="ko-KR" b="0" i="1" smtClean="0">
+                          <a:latin typeface="Cambria Math" panose="02040503050406030204" pitchFamily="18" charset="0"/>
+                        </a:rPr>
+                        <m:t> </m:t>
+                      </m:r>
+                    </m:oMath>
+                  </m:oMathPara>
+                </a14:m>
+                <a:endParaRPr lang="ko-KR" altLang="en-US" dirty="0"/>
+              </a:p>
+              <a:p>
+                <a:endParaRPr lang="ko-KR" altLang="en-US" dirty="0"/>
+              </a:p>
+            </p:txBody>
+          </p:sp>
+        </mc:Choice>
+        <mc:Fallback xmlns="">
+          <p:sp>
+            <p:nvSpPr>
+              <p:cNvPr id="13" name="TextBox 12">
+                <a:extLst>
+                  <a:ext uri="{FF2B5EF4-FFF2-40B4-BE49-F238E27FC236}">
+                    <a16:creationId xmlns:a16="http://schemas.microsoft.com/office/drawing/2014/main" id="{55FD2AAA-089E-5E47-3209-E64E4B5CF151}"/>
+                  </a:ext>
+                </a:extLst>
+              </p:cNvPr>
+              <p:cNvSpPr txBox="1">
+                <a:spLocks noRot="1" noChangeAspect="1" noMove="1" noResize="1" noEditPoints="1" noAdjustHandles="1" noChangeArrowheads="1" noChangeShapeType="1" noTextEdit="1"/>
+              </p:cNvSpPr>
+              <p:nvPr/>
+            </p:nvSpPr>
+            <p:spPr>
+              <a:xfrm>
+                <a:off x="6469226" y="2640675"/>
+                <a:ext cx="1244187" cy="704873"/>
+              </a:xfrm>
+              <a:prstGeom prst="rect">
+                <a:avLst/>
+              </a:prstGeom>
+              <a:blipFill>
+                <a:blip r:embed="rId3"/>
+                <a:stretch>
+                  <a:fillRect/>
+                </a:stretch>
+              </a:blipFill>
+            </p:spPr>
+            <p:txBody>
+              <a:bodyPr/>
+              <a:lstStyle/>
+              <a:p>
+                <a:r>
+                  <a:rPr lang="ko-KR" altLang="en-US">
+                    <a:noFill/>
+                  </a:rPr>
+                  <a:t> </a:t>
+                </a:r>
+              </a:p>
+            </p:txBody>
+          </p:sp>
+        </mc:Fallback>
+      </mc:AlternateContent>
+      <p:sp>
+        <p:nvSpPr>
+          <p:cNvPr id="17" name="번개 16">
+            <a:extLst>
+              <a:ext uri="{FF2B5EF4-FFF2-40B4-BE49-F238E27FC236}">
+                <a16:creationId xmlns:a16="http://schemas.microsoft.com/office/drawing/2014/main" id="{64DEA46B-96D6-607E-A42A-F28F5EA4F684}"/>
+              </a:ext>
+            </a:extLst>
+          </p:cNvPr>
+          <p:cNvSpPr/>
+          <p:nvPr/>
+        </p:nvSpPr>
+        <p:spPr>
+          <a:xfrm flipH="1">
+            <a:off x="7086752" y="1340528"/>
+            <a:ext cx="1244187" cy="1300147"/>
+          </a:xfrm>
+          <a:prstGeom prst="lightningBolt">
+            <a:avLst/>
+          </a:prstGeom>
+          <a:ln>
+            <a:solidFill>
+              <a:srgbClr val="FFFF00"/>
+            </a:solidFill>
+          </a:ln>
+        </p:spPr>
+        <p:style>
+          <a:lnRef idx="2">
+            <a:schemeClr val="accent4">
+              <a:shade val="15000"/>
+            </a:schemeClr>
+          </a:lnRef>
+          <a:fillRef idx="1">
+            <a:schemeClr val="accent4"/>
+          </a:fillRef>
+          <a:effectRef idx="0">
+            <a:schemeClr val="accent4"/>
+          </a:effectRef>
+          <a:fontRef idx="minor">
+            <a:schemeClr val="lt1"/>
+          </a:fontRef>
+        </p:style>
+        <p:txBody>
+          <a:bodyPr rtlCol="0" anchor="ctr"/>
+          <a:lstStyle/>
+          <a:p>
+            <a:pPr algn="ctr"/>
+            <a:endParaRPr lang="ko-KR" altLang="en-US"/>
+          </a:p>
+        </p:txBody>
+      </p:sp>
+      <p:sp>
+        <p:nvSpPr>
+          <p:cNvPr id="18" name="TextBox 17">
+            <a:extLst>
+              <a:ext uri="{FF2B5EF4-FFF2-40B4-BE49-F238E27FC236}">
+                <a16:creationId xmlns:a16="http://schemas.microsoft.com/office/drawing/2014/main" id="{FCD296E1-8F8D-8AB9-56C9-99CEC0834D9B}"/>
+              </a:ext>
+            </a:extLst>
+          </p:cNvPr>
+          <p:cNvSpPr txBox="1"/>
+          <p:nvPr/>
+        </p:nvSpPr>
+        <p:spPr>
+          <a:xfrm>
+            <a:off x="7302029" y="861101"/>
+            <a:ext cx="1249060" cy="646331"/>
+          </a:xfrm>
+          <a:prstGeom prst="rect">
+            <a:avLst/>
+          </a:prstGeom>
+          <a:noFill/>
+        </p:spPr>
+        <p:txBody>
+          <a:bodyPr wrap="none" rtlCol="0">
+            <a:spAutoFit/>
+          </a:bodyPr>
+          <a:lstStyle/>
+          <a:p>
+            <a:r>
+              <a:rPr lang="en-US" altLang="ko-KR" b="0" i="0" dirty="0">
+                <a:effectLst/>
+                <a:latin typeface="Arial" panose="020B0604020202020204" pitchFamily="34" charset="0"/>
+              </a:rPr>
+              <a:t>Guo et al. </a:t>
+            </a:r>
+          </a:p>
+          <a:p>
+            <a:r>
+              <a:rPr lang="en-US" altLang="ko-KR" b="0" i="0" dirty="0">
+                <a:effectLst/>
+                <a:latin typeface="Arial" panose="020B0604020202020204" pitchFamily="34" charset="0"/>
+              </a:rPr>
+              <a:t>[GNSJ24]</a:t>
+            </a:r>
+            <a:endParaRPr lang="ko-KR" altLang="en-US" dirty="0"/>
+          </a:p>
+        </p:txBody>
+      </p:sp>
+      <p:sp>
+        <p:nvSpPr>
+          <p:cNvPr id="19" name="타원 18">
+            <a:extLst>
+              <a:ext uri="{FF2B5EF4-FFF2-40B4-BE49-F238E27FC236}">
+                <a16:creationId xmlns:a16="http://schemas.microsoft.com/office/drawing/2014/main" id="{F2A043EF-21AA-3051-E210-8ACA290252A7}"/>
+              </a:ext>
+            </a:extLst>
+          </p:cNvPr>
+          <p:cNvSpPr/>
+          <p:nvPr/>
+        </p:nvSpPr>
+        <p:spPr>
+          <a:xfrm>
+            <a:off x="6480111" y="2563909"/>
+            <a:ext cx="1089386" cy="600114"/>
+          </a:xfrm>
+          <a:prstGeom prst="ellipse">
+            <a:avLst/>
+          </a:prstGeom>
+          <a:noFill/>
+          <a:ln>
+            <a:solidFill>
+              <a:srgbClr val="FFC000"/>
+            </a:solidFill>
+          </a:ln>
+        </p:spPr>
+        <p:style>
+          <a:lnRef idx="2">
+            <a:schemeClr val="accent1">
+              <a:shade val="15000"/>
+            </a:schemeClr>
+          </a:lnRef>
+          <a:fillRef idx="1">
+            <a:schemeClr val="accent1"/>
+          </a:fillRef>
+          <a:effectRef idx="0">
+            <a:schemeClr val="accent1"/>
+          </a:effectRef>
+          <a:fontRef idx="minor">
+            <a:schemeClr val="lt1"/>
+          </a:fontRef>
+        </p:style>
+        <p:txBody>
+          <a:bodyPr rtlCol="0" anchor="ctr"/>
+          <a:lstStyle/>
+          <a:p>
+            <a:pPr algn="ctr"/>
+            <a:endParaRPr lang="ko-KR" altLang="en-US"/>
+          </a:p>
+        </p:txBody>
+      </p:sp>
+      <p:sp>
+        <p:nvSpPr>
+          <p:cNvPr id="9" name="번개 8">
+            <a:extLst>
+              <a:ext uri="{FF2B5EF4-FFF2-40B4-BE49-F238E27FC236}">
+                <a16:creationId xmlns:a16="http://schemas.microsoft.com/office/drawing/2014/main" id="{5A427B6A-5922-EA19-BBE8-DFBD27B95280}"/>
+              </a:ext>
+            </a:extLst>
+          </p:cNvPr>
+          <p:cNvSpPr/>
+          <p:nvPr/>
+        </p:nvSpPr>
+        <p:spPr>
+          <a:xfrm rot="4497718" flipH="1">
+            <a:off x="7584568" y="3096334"/>
+            <a:ext cx="617291" cy="1632564"/>
+          </a:xfrm>
+          <a:prstGeom prst="lightningBolt">
+            <a:avLst/>
+          </a:prstGeom>
+          <a:ln>
+            <a:solidFill>
+              <a:srgbClr val="FFFF00"/>
+            </a:solidFill>
+          </a:ln>
+        </p:spPr>
+        <p:style>
+          <a:lnRef idx="2">
+            <a:schemeClr val="accent4">
+              <a:shade val="15000"/>
+            </a:schemeClr>
+          </a:lnRef>
+          <a:fillRef idx="1">
+            <a:schemeClr val="accent4"/>
+          </a:fillRef>
+          <a:effectRef idx="0">
+            <a:schemeClr val="accent4"/>
+          </a:effectRef>
+          <a:fontRef idx="minor">
+            <a:schemeClr val="lt1"/>
+          </a:fontRef>
+        </p:style>
+        <p:txBody>
+          <a:bodyPr rtlCol="0" anchor="ctr"/>
+          <a:lstStyle/>
+          <a:p>
+            <a:pPr algn="ctr"/>
+            <a:endParaRPr lang="ko-KR" altLang="en-US"/>
+          </a:p>
+        </p:txBody>
+      </p:sp>
+      <p:sp>
+        <p:nvSpPr>
+          <p:cNvPr id="10" name="번개 9">
+            <a:extLst>
+              <a:ext uri="{FF2B5EF4-FFF2-40B4-BE49-F238E27FC236}">
+                <a16:creationId xmlns:a16="http://schemas.microsoft.com/office/drawing/2014/main" id="{367CD2E1-5466-F18D-953B-AE915FD549CB}"/>
+              </a:ext>
+            </a:extLst>
+          </p:cNvPr>
+          <p:cNvSpPr/>
+          <p:nvPr/>
+        </p:nvSpPr>
+        <p:spPr>
+          <a:xfrm>
+            <a:off x="4135798" y="2275318"/>
+            <a:ext cx="1211112" cy="770692"/>
+          </a:xfrm>
+          <a:prstGeom prst="lightningBolt">
+            <a:avLst/>
+          </a:prstGeom>
+          <a:ln>
+            <a:solidFill>
+              <a:srgbClr val="FFFF00"/>
+            </a:solidFill>
+          </a:ln>
+        </p:spPr>
+        <p:style>
+          <a:lnRef idx="2">
+            <a:schemeClr val="accent4">
+              <a:shade val="15000"/>
+            </a:schemeClr>
+          </a:lnRef>
+          <a:fillRef idx="1">
+            <a:schemeClr val="accent4"/>
+          </a:fillRef>
+          <a:effectRef idx="0">
+            <a:schemeClr val="accent4"/>
+          </a:effectRef>
+          <a:fontRef idx="minor">
+            <a:schemeClr val="lt1"/>
+          </a:fontRef>
+        </p:style>
+        <p:txBody>
+          <a:bodyPr rtlCol="0" anchor="ctr"/>
+          <a:lstStyle/>
+          <a:p>
+            <a:pPr algn="ctr"/>
+            <a:endParaRPr lang="ko-KR" altLang="en-US"/>
+          </a:p>
+        </p:txBody>
+      </p:sp>
+      <p:sp>
+        <p:nvSpPr>
+          <p:cNvPr id="15" name="번개 14">
+            <a:extLst>
+              <a:ext uri="{FF2B5EF4-FFF2-40B4-BE49-F238E27FC236}">
+                <a16:creationId xmlns:a16="http://schemas.microsoft.com/office/drawing/2014/main" id="{C7E0C81C-C921-D40E-89E1-97899E5830E3}"/>
+              </a:ext>
+            </a:extLst>
+          </p:cNvPr>
+          <p:cNvSpPr/>
+          <p:nvPr/>
+        </p:nvSpPr>
+        <p:spPr>
+          <a:xfrm rot="19932285">
+            <a:off x="2523471" y="2186124"/>
+            <a:ext cx="1399679" cy="1613975"/>
+          </a:xfrm>
+          <a:prstGeom prst="lightningBolt">
+            <a:avLst/>
+          </a:prstGeom>
+          <a:ln>
+            <a:solidFill>
+              <a:srgbClr val="FFFF00"/>
+            </a:solidFill>
+          </a:ln>
+        </p:spPr>
+        <p:style>
+          <a:lnRef idx="2">
+            <a:schemeClr val="accent4">
+              <a:shade val="15000"/>
+            </a:schemeClr>
+          </a:lnRef>
+          <a:fillRef idx="1">
+            <a:schemeClr val="accent4"/>
+          </a:fillRef>
+          <a:effectRef idx="0">
+            <a:schemeClr val="accent4"/>
+          </a:effectRef>
+          <a:fontRef idx="minor">
+            <a:schemeClr val="lt1"/>
+          </a:fontRef>
+        </p:style>
+        <p:txBody>
+          <a:bodyPr rtlCol="0" anchor="ctr"/>
+          <a:lstStyle/>
+          <a:p>
+            <a:pPr algn="ctr"/>
+            <a:endParaRPr lang="ko-KR" altLang="en-US"/>
+          </a:p>
+        </p:txBody>
+      </p:sp>
+      <p:sp>
+        <p:nvSpPr>
+          <p:cNvPr id="16" name="번개 15">
+            <a:extLst>
+              <a:ext uri="{FF2B5EF4-FFF2-40B4-BE49-F238E27FC236}">
+                <a16:creationId xmlns:a16="http://schemas.microsoft.com/office/drawing/2014/main" id="{D97051DF-8DA2-3834-0E04-7539EC86F3BB}"/>
+              </a:ext>
+            </a:extLst>
+          </p:cNvPr>
+          <p:cNvSpPr/>
+          <p:nvPr/>
+        </p:nvSpPr>
+        <p:spPr>
+          <a:xfrm rot="14629858">
+            <a:off x="4192887" y="4149327"/>
+            <a:ext cx="1205592" cy="1339015"/>
+          </a:xfrm>
+          <a:prstGeom prst="lightningBolt">
+            <a:avLst/>
+          </a:prstGeom>
+          <a:ln>
+            <a:solidFill>
+              <a:srgbClr val="FFFF00"/>
+            </a:solidFill>
+          </a:ln>
+        </p:spPr>
+        <p:style>
+          <a:lnRef idx="2">
+            <a:schemeClr val="accent4">
+              <a:shade val="15000"/>
+            </a:schemeClr>
+          </a:lnRef>
+          <a:fillRef idx="1">
+            <a:schemeClr val="accent4"/>
+          </a:fillRef>
+          <a:effectRef idx="0">
+            <a:schemeClr val="accent4"/>
+          </a:effectRef>
+          <a:fontRef idx="minor">
+            <a:schemeClr val="lt1"/>
+          </a:fontRef>
+        </p:style>
+        <p:txBody>
+          <a:bodyPr rtlCol="0" anchor="ctr"/>
+          <a:lstStyle/>
+          <a:p>
+            <a:pPr algn="ctr"/>
+            <a:endParaRPr lang="ko-KR" altLang="en-US"/>
+          </a:p>
+        </p:txBody>
+      </p:sp>
+    </p:spTree>
+    <p:extLst>
+      <p:ext uri="{BB962C8B-B14F-4D97-AF65-F5344CB8AC3E}">
+        <p14:creationId xmlns:p14="http://schemas.microsoft.com/office/powerpoint/2010/main" val="3965699370"/>
       </p:ext>
     </p:extLst>
   </p:cSld>

</xml_diff>